<commit_message>
vault backup: 2026-02-05 14:23:05
</commit_message>
<xml_diff>
--- a/考研.pptx
+++ b/考研.pptx
@@ -5,7 +5,7 @@
     <p:sldMasterId id="2147483672" r:id="rId1"/>
   </p:sldMasterIdLst>
   <p:notesMasterIdLst>
-    <p:notesMasterId r:id="rId28"/>
+    <p:notesMasterId r:id="rId33"/>
   </p:notesMasterIdLst>
   <p:sldIdLst>
     <p:sldId id="256" r:id="rId2"/>
@@ -34,6 +34,11 @@
     <p:sldId id="284" r:id="rId25"/>
     <p:sldId id="285" r:id="rId26"/>
     <p:sldId id="286" r:id="rId27"/>
+    <p:sldId id="287" r:id="rId28"/>
+    <p:sldId id="288" r:id="rId29"/>
+    <p:sldId id="291" r:id="rId30"/>
+    <p:sldId id="289" r:id="rId31"/>
+    <p:sldId id="290" r:id="rId32"/>
   </p:sldIdLst>
   <p:sldSz cx="12192000" cy="6858000"/>
   <p:notesSz cx="6858000" cy="9144000"/>
@@ -140,6 +145,146 @@
 </p:presentation>
 </file>
 
+<file path=ppt/ink/ink1.xml><?xml version="1.0" encoding="utf-8"?>
+<inkml:ink xmlns:inkml="http://www.w3.org/2003/InkML">
+  <inkml:definitions>
+    <inkml:context xml:id="ctx0">
+      <inkml:inkSource xml:id="inkSrc0">
+        <inkml:traceFormat>
+          <inkml:channel name="X" type="integer" min="-2.14748E9" max="2.14748E9" units="cm"/>
+          <inkml:channel name="Y" type="integer" min="-2.14748E9" max="2.14748E9" units="cm"/>
+          <inkml:channel name="F" type="integer" max="32767" units="dev"/>
+        </inkml:traceFormat>
+        <inkml:channelProperties>
+          <inkml:channelProperty channel="X" name="resolution" value="1000" units="1/cm"/>
+          <inkml:channelProperty channel="Y" name="resolution" value="1000" units="1/cm"/>
+          <inkml:channelProperty channel="F" name="resolution" value="0" units="1/dev"/>
+        </inkml:channelProperties>
+      </inkml:inkSource>
+      <inkml:timestamp xml:id="ts0" timeString="2026-01-31T04:09:32.253"/>
+    </inkml:context>
+    <inkml:brush xml:id="br0">
+      <inkml:brushProperty name="width" value="0.035" units="cm"/>
+      <inkml:brushProperty name="height" value="0.035" units="cm"/>
+      <inkml:brushProperty name="color" value="#E71224"/>
+    </inkml:brush>
+  </inkml:definitions>
+  <inkml:trace contextRef="#ctx0" brushRef="#br0">487 7 24575,'0'0'0,"0"-1"0,-1 1 0,1-1 0,-1 1 0,1-1 0,-1 1 0,1-1 0,-1 1 0,0 0 0,1 0 0,-1-1 0,1 1 0,-1 0 0,0 0 0,1-1 0,-1 1 0,1 0 0,-1 0 0,0 0 0,1 0 0,-1 0 0,0 0 0,1 0 0,-1 0 0,0 0 0,1 0 0,-2 1 0,-19 1 0,-14 3 0,24-4 0,0 1 0,0 0 0,1 0 0,-21 8 0,27-9 0,1 1 0,0-1 0,0 1 0,-1 0 0,1 0 0,0 0 0,1 0 0,-1 1 0,0-1 0,1 1 0,-1 0 0,1-1 0,0 1 0,0 0 0,0 0 0,0 1 0,0-1 0,1 0 0,0 1 0,-1-1 0,1 1 0,0-1 0,0 5 0,1-3 0,0-1 0,1 1 0,0 0 0,-1-1 0,1 1 0,1-1 0,-1 1 0,1-1 0,0 0 0,0 0 0,0 0 0,0 0 0,1 0 0,-1 0 0,1 0 0,0-1 0,7 7 0,-5-5 0,1 0 0,-2 1 0,1 0 0,-1 0 0,0 0 0,0 0 0,0 1 0,-1-1 0,0 1 0,-1 0 0,1 0 0,-1 0 0,-1 0 0,2 9 0,-3-10 0,0 0 0,0 0 0,0 0 0,-1 0 0,0 0 0,0 0 0,0 0 0,-1-1 0,0 1 0,0-1 0,0 1 0,-1-1 0,0 0 0,0 1 0,0-2 0,-1 1 0,0 0 0,-4 4 0,-3 2 0,0-1 0,-1 0 0,0-1 0,0 0 0,-1-1 0,0-1 0,-1 0 0,0 0 0,0-2 0,0 1 0,0-2 0,-1 0 0,0-1 0,0 0 0,0-1 0,0-1 0,0 0 0,0-1 0,-1-1 0,1-1 0,0 0 0,-14-4 0,80 31 0,-9-9 0,-20-8 0,-1 0 0,0 1 0,34 21 0,-53-29 0,-1 1 0,1-1 0,0 1 0,-1-1 0,1 1 0,-1 0 0,0-1 0,1 1 0,-1 0 0,0 0 0,0 0 0,0 0 0,-1 0 0,1 0 0,0 0 0,0 4 0,-1-2 0,1 1 0,-1-1 0,0 1 0,-1-1 0,1 0 0,-1 1 0,-2 7 0,-1 1 0,-1 0 0,0 0 0,-2 0 0,-8 13 0,-8 11 0,8-15 0,1 0 0,1 2 0,1-1 0,-13 36 0,23-52 0,0-1 0,1 0 0,0 1 0,0-1 0,0 1 0,1-1 0,-1 1 0,2-1 0,-1 1 0,1-1 0,0 1 0,0-1 0,1 0 0,-1 1 0,2-1 0,-1 0 0,1 0 0,-1 0 0,2-1 0,-1 1 0,1 0 0,-1-1 0,7 6 0,-6-7 0,0 0 0,0 0 0,1-1 0,-1 0 0,1 0 0,0 0 0,-1 0 0,1-1 0,0 1 0,1-1 0,-1-1 0,10 3 0,-2-2 0,1-1 0,-1 0 0,1-1 0,14-1 0,-28 1-65,1 0 0,0 0 0,0 0 0,0 0 0,0 0 0,0-1 0,0 1 0,-1 0 0,1 0 0,0-1 0,0 1 0,0 0 0,0-1 0,-1 1 0,1-1 0,0 1 0,-1-1 0,1 1 0,0-1 0,0 0 0</inkml:trace>
+</inkml:ink>
+</file>
+
+<file path=ppt/ink/ink2.xml><?xml version="1.0" encoding="utf-8"?>
+<inkml:ink xmlns:inkml="http://www.w3.org/2003/InkML">
+  <inkml:definitions>
+    <inkml:context xml:id="ctx0">
+      <inkml:inkSource xml:id="inkSrc0">
+        <inkml:traceFormat>
+          <inkml:channel name="X" type="integer" min="-2.14748E9" max="2.14748E9" units="cm"/>
+          <inkml:channel name="Y" type="integer" min="-2.14748E9" max="2.14748E9" units="cm"/>
+          <inkml:channel name="F" type="integer" max="32767" units="dev"/>
+        </inkml:traceFormat>
+        <inkml:channelProperties>
+          <inkml:channelProperty channel="X" name="resolution" value="1000" units="1/cm"/>
+          <inkml:channelProperty channel="Y" name="resolution" value="1000" units="1/cm"/>
+          <inkml:channelProperty channel="F" name="resolution" value="0" units="1/dev"/>
+        </inkml:channelProperties>
+      </inkml:inkSource>
+      <inkml:timestamp xml:id="ts0" timeString="2026-01-31T04:09:44.261"/>
+    </inkml:context>
+    <inkml:brush xml:id="br0">
+      <inkml:brushProperty name="width" value="0.035" units="cm"/>
+      <inkml:brushProperty name="height" value="0.035" units="cm"/>
+      <inkml:brushProperty name="color" value="#E71224"/>
+    </inkml:brush>
+  </inkml:definitions>
+  <inkml:trace contextRef="#ctx0" brushRef="#br0">0 0 24575,'1'1'0,"1"0"0,-1 0 0,1 0 0,0 0 0,-1 0 0,1-1 0,-1 1 0,1-1 0,0 1 0,-1-1 0,4 0 0,0 1 0,23 7 0,89 21 0,-99-26 0,0 0 0,1-1 0,-1-2 0,28-1 0,-44 1-72,-1 0 1,1-1-1,0 1 0,-1 0 0,1-1 0,-1 0 0,1 1 0,0-1 1,-1 0-1,1 0 0,-1 0 0,0 0 0,1 0 0,-1 0 0,0 0 1,0 0-1,1-1 0,0-1 0</inkml:trace>
+</inkml:ink>
+</file>
+
+<file path=ppt/ink/ink3.xml><?xml version="1.0" encoding="utf-8"?>
+<inkml:ink xmlns:inkml="http://www.w3.org/2003/InkML">
+  <inkml:definitions>
+    <inkml:context xml:id="ctx0">
+      <inkml:inkSource xml:id="inkSrc0">
+        <inkml:traceFormat>
+          <inkml:channel name="X" type="integer" min="-2.14748E9" max="2.14748E9" units="cm"/>
+          <inkml:channel name="Y" type="integer" min="-2.14748E9" max="2.14748E9" units="cm"/>
+          <inkml:channel name="F" type="integer" max="32767" units="dev"/>
+        </inkml:traceFormat>
+        <inkml:channelProperties>
+          <inkml:channelProperty channel="X" name="resolution" value="1000" units="1/cm"/>
+          <inkml:channelProperty channel="Y" name="resolution" value="1000" units="1/cm"/>
+          <inkml:channelProperty channel="F" name="resolution" value="0" units="1/dev"/>
+        </inkml:channelProperties>
+      </inkml:inkSource>
+      <inkml:timestamp xml:id="ts0" timeString="2026-01-31T04:09:45.243"/>
+    </inkml:context>
+    <inkml:brush xml:id="br0">
+      <inkml:brushProperty name="width" value="0.035" units="cm"/>
+      <inkml:brushProperty name="height" value="0.035" units="cm"/>
+      <inkml:brushProperty name="color" value="#E71224"/>
+    </inkml:brush>
+  </inkml:definitions>
+  <inkml:trace contextRef="#ctx0" brushRef="#br0">116 0 24575,'-1'1'0,"-1"0"0,0 1 0,0-1 0,1 0 0,-1 0 0,1 1 0,-1-1 0,1 1 0,-2 2 0,-3 2 0,-21 16 0,20-18 0,1 1 0,-1 0 0,1 0 0,0 1 0,0 0 0,1 0 0,0 0 0,0 1 0,-6 10 0,10-15 0,1-1 0,0 1 0,0-1 0,0 1 0,0-1 0,0 1 0,0-1 0,0 0 0,0 1 0,1-1 0,-1 1 0,0-1 0,1 1 0,0-1 0,-1 0 0,1 1 0,1 1 0,18 25 0,-7-9 0,23 56-1365,-33-69-5461</inkml:trace>
+</inkml:ink>
+</file>
+
+<file path=ppt/ink/ink4.xml><?xml version="1.0" encoding="utf-8"?>
+<inkml:ink xmlns:inkml="http://www.w3.org/2003/InkML">
+  <inkml:definitions>
+    <inkml:context xml:id="ctx0">
+      <inkml:inkSource xml:id="inkSrc0">
+        <inkml:traceFormat>
+          <inkml:channel name="X" type="integer" min="-2.14748E9" max="2.14748E9" units="cm"/>
+          <inkml:channel name="Y" type="integer" min="-2.14748E9" max="2.14748E9" units="cm"/>
+          <inkml:channel name="F" type="integer" max="32767" units="dev"/>
+        </inkml:traceFormat>
+        <inkml:channelProperties>
+          <inkml:channelProperty channel="X" name="resolution" value="1000" units="1/cm"/>
+          <inkml:channelProperty channel="Y" name="resolution" value="1000" units="1/cm"/>
+          <inkml:channelProperty channel="F" name="resolution" value="0" units="1/dev"/>
+        </inkml:channelProperties>
+      </inkml:inkSource>
+      <inkml:timestamp xml:id="ts0" timeString="2026-01-31T04:09:47.291"/>
+    </inkml:context>
+    <inkml:brush xml:id="br0">
+      <inkml:brushProperty name="width" value="0.035" units="cm"/>
+      <inkml:brushProperty name="height" value="0.035" units="cm"/>
+      <inkml:brushProperty name="color" value="#E71224"/>
+    </inkml:brush>
+  </inkml:definitions>
+  <inkml:trace contextRef="#ctx0" brushRef="#br0">0 0 24575,'1'0'0,"3"0"0,5 0 0,4 1 0,3 1 0,6 0 0,0 0 0,4 0 0,0 1 0,2-1 0,1 0 0,0 1 0,-3 0 0,-5 0 0,-4-1 0,-3 0 0,-4-1 0,-3-1-8191</inkml:trace>
+</inkml:ink>
+</file>
+
+<file path=ppt/ink/ink5.xml><?xml version="1.0" encoding="utf-8"?>
+<inkml:ink xmlns:inkml="http://www.w3.org/2003/InkML">
+  <inkml:definitions>
+    <inkml:context xml:id="ctx0">
+      <inkml:inkSource xml:id="inkSrc0">
+        <inkml:traceFormat>
+          <inkml:channel name="X" type="integer" min="-2.14748E9" max="2.14748E9" units="cm"/>
+          <inkml:channel name="Y" type="integer" min="-2.14748E9" max="2.14748E9" units="cm"/>
+          <inkml:channel name="F" type="integer" max="32767" units="dev"/>
+        </inkml:traceFormat>
+        <inkml:channelProperties>
+          <inkml:channelProperty channel="X" name="resolution" value="1000" units="1/cm"/>
+          <inkml:channelProperty channel="Y" name="resolution" value="1000" units="1/cm"/>
+          <inkml:channelProperty channel="F" name="resolution" value="0" units="1/dev"/>
+        </inkml:channelProperties>
+      </inkml:inkSource>
+      <inkml:timestamp xml:id="ts0" timeString="2026-01-31T04:09:48.433"/>
+    </inkml:context>
+    <inkml:brush xml:id="br0">
+      <inkml:brushProperty name="width" value="0.035" units="cm"/>
+      <inkml:brushProperty name="height" value="0.035" units="cm"/>
+      <inkml:brushProperty name="color" value="#E71224"/>
+    </inkml:brush>
+  </inkml:definitions>
+  <inkml:trace contextRef="#ctx0" brushRef="#br0">1 1 24575,'2'1'0,"1"0"0,0 1 0,-1-1 0,1 1 0,-1 0 0,0-1 0,1 1 0,2 4 0,2 0 0,7 6 0,0 0 0,24 27 0,-34-34 0,0 1 0,0-1 0,0 0 0,-1 1 0,0 0 0,0 0 0,-1 0 0,1 0 0,-1 0 0,-1 1 0,3 12 0,-4-17 0,0-1 0,-1 1 0,1 0 0,0 0 0,-1-1 0,1 1 0,-1 0 0,0-1 0,1 1 0,-1-1 0,0 1 0,0-1 0,0 1 0,0-1 0,0 1 0,-2 1 0,-27 22 0,5-4 0,6-1-1365</inkml:trace>
+</inkml:ink>
+</file>
+
 <file path=ppt/notesMasters/notesMaster1.xml><?xml version="1.0" encoding="utf-8"?>
 <p:notesMaster xmlns:a="http://schemas.openxmlformats.org/drawingml/2006/main" xmlns:r="http://schemas.openxmlformats.org/officeDocument/2006/relationships" xmlns:p="http://schemas.openxmlformats.org/presentationml/2006/main">
   <p:cSld>
@@ -222,7 +367,7 @@
           <a:p>
             <a:fld id="{07E5D595-80C0-4B28-BA03-ED45ADACC533}" type="datetimeFigureOut">
               <a:rPr lang="zh-TW" altLang="en-US" smtClean="0"/>
-              <a:t>2026/1/30</a:t>
+              <a:t>2026/2/2</a:t>
             </a:fld>
             <a:endParaRPr lang="zh-TW" altLang="en-US"/>
           </a:p>
@@ -789,6 +934,546 @@
 </p:notes>
 </file>
 
+<file path=ppt/notesSlides/notesSlide4.xml><?xml version="1.0" encoding="utf-8"?>
+<p:notes xmlns:a="http://schemas.openxmlformats.org/drawingml/2006/main" xmlns:r="http://schemas.openxmlformats.org/officeDocument/2006/relationships" xmlns:p="http://schemas.openxmlformats.org/presentationml/2006/main">
+  <p:cSld>
+    <p:spTree>
+      <p:nvGrpSpPr>
+        <p:cNvPr id="1" name="">
+          <a:extLst>
+            <a:ext uri="{FF2B5EF4-FFF2-40B4-BE49-F238E27FC236}">
+              <a16:creationId xmlns:a16="http://schemas.microsoft.com/office/drawing/2014/main" id="{AF58638F-89D5-2760-A5CD-1BE849CA3AD2}"/>
+            </a:ext>
+          </a:extLst>
+        </p:cNvPr>
+        <p:cNvGrpSpPr/>
+        <p:nvPr/>
+      </p:nvGrpSpPr>
+      <p:grpSpPr>
+        <a:xfrm>
+          <a:off x="0" y="0"/>
+          <a:ext cx="0" cy="0"/>
+          <a:chOff x="0" y="0"/>
+          <a:chExt cx="0" cy="0"/>
+        </a:xfrm>
+      </p:grpSpPr>
+      <p:sp>
+        <p:nvSpPr>
+          <p:cNvPr id="2" name="投影片影像版面配置區 1">
+            <a:extLst>
+              <a:ext uri="{FF2B5EF4-FFF2-40B4-BE49-F238E27FC236}">
+                <a16:creationId xmlns:a16="http://schemas.microsoft.com/office/drawing/2014/main" id="{31F07A60-62AF-2827-D6C3-30D1AF4CC499}"/>
+              </a:ext>
+            </a:extLst>
+          </p:cNvPr>
+          <p:cNvSpPr>
+            <a:spLocks noGrp="1" noRot="1" noChangeAspect="1"/>
+          </p:cNvSpPr>
+          <p:nvPr>
+            <p:ph type="sldImg"/>
+          </p:nvPr>
+        </p:nvSpPr>
+        <p:spPr/>
+      </p:sp>
+      <p:sp>
+        <p:nvSpPr>
+          <p:cNvPr id="3" name="備忘稿版面配置區 2">
+            <a:extLst>
+              <a:ext uri="{FF2B5EF4-FFF2-40B4-BE49-F238E27FC236}">
+                <a16:creationId xmlns:a16="http://schemas.microsoft.com/office/drawing/2014/main" id="{66236718-BD01-9B7E-7BE9-F336D4CB61E9}"/>
+              </a:ext>
+            </a:extLst>
+          </p:cNvPr>
+          <p:cNvSpPr>
+            <a:spLocks noGrp="1"/>
+          </p:cNvSpPr>
+          <p:nvPr>
+            <p:ph type="body" idx="1"/>
+          </p:nvPr>
+        </p:nvSpPr>
+        <p:spPr/>
+        <p:txBody>
+          <a:bodyPr/>
+          <a:lstStyle/>
+          <a:p>
+            <a:endParaRPr lang="zh-TW" altLang="en-US" dirty="0"/>
+          </a:p>
+        </p:txBody>
+      </p:sp>
+      <p:sp>
+        <p:nvSpPr>
+          <p:cNvPr id="4" name="投影片編號版面配置區 3">
+            <a:extLst>
+              <a:ext uri="{FF2B5EF4-FFF2-40B4-BE49-F238E27FC236}">
+                <a16:creationId xmlns:a16="http://schemas.microsoft.com/office/drawing/2014/main" id="{232DCA17-832F-017E-92A6-BDA991E21873}"/>
+              </a:ext>
+            </a:extLst>
+          </p:cNvPr>
+          <p:cNvSpPr>
+            <a:spLocks noGrp="1"/>
+          </p:cNvSpPr>
+          <p:nvPr>
+            <p:ph type="sldNum" sz="quarter" idx="5"/>
+          </p:nvPr>
+        </p:nvSpPr>
+        <p:spPr/>
+        <p:txBody>
+          <a:bodyPr/>
+          <a:lstStyle/>
+          <a:p>
+            <a:fld id="{5281C8EC-84E3-4AA0-83D2-C262AD0C7E35}" type="slidenum">
+              <a:rPr lang="zh-TW" altLang="en-US" smtClean="0"/>
+              <a:t>27</a:t>
+            </a:fld>
+            <a:endParaRPr lang="zh-TW" altLang="en-US"/>
+          </a:p>
+        </p:txBody>
+      </p:sp>
+    </p:spTree>
+    <p:extLst>
+      <p:ext uri="{BB962C8B-B14F-4D97-AF65-F5344CB8AC3E}">
+        <p14:creationId xmlns:p14="http://schemas.microsoft.com/office/powerpoint/2010/main" val="2874216686"/>
+      </p:ext>
+    </p:extLst>
+  </p:cSld>
+  <p:clrMapOvr>
+    <a:masterClrMapping/>
+  </p:clrMapOvr>
+</p:notes>
+</file>
+
+<file path=ppt/notesSlides/notesSlide5.xml><?xml version="1.0" encoding="utf-8"?>
+<p:notes xmlns:a="http://schemas.openxmlformats.org/drawingml/2006/main" xmlns:r="http://schemas.openxmlformats.org/officeDocument/2006/relationships" xmlns:p="http://schemas.openxmlformats.org/presentationml/2006/main">
+  <p:cSld>
+    <p:spTree>
+      <p:nvGrpSpPr>
+        <p:cNvPr id="1" name="">
+          <a:extLst>
+            <a:ext uri="{FF2B5EF4-FFF2-40B4-BE49-F238E27FC236}">
+              <a16:creationId xmlns:a16="http://schemas.microsoft.com/office/drawing/2014/main" id="{A775638B-4B3D-0E0E-73FE-774869EBF823}"/>
+            </a:ext>
+          </a:extLst>
+        </p:cNvPr>
+        <p:cNvGrpSpPr/>
+        <p:nvPr/>
+      </p:nvGrpSpPr>
+      <p:grpSpPr>
+        <a:xfrm>
+          <a:off x="0" y="0"/>
+          <a:ext cx="0" cy="0"/>
+          <a:chOff x="0" y="0"/>
+          <a:chExt cx="0" cy="0"/>
+        </a:xfrm>
+      </p:grpSpPr>
+      <p:sp>
+        <p:nvSpPr>
+          <p:cNvPr id="2" name="投影片影像版面配置區 1">
+            <a:extLst>
+              <a:ext uri="{FF2B5EF4-FFF2-40B4-BE49-F238E27FC236}">
+                <a16:creationId xmlns:a16="http://schemas.microsoft.com/office/drawing/2014/main" id="{6E47926F-4F63-14BB-A4FB-E361FEB709D0}"/>
+              </a:ext>
+            </a:extLst>
+          </p:cNvPr>
+          <p:cNvSpPr>
+            <a:spLocks noGrp="1" noRot="1" noChangeAspect="1"/>
+          </p:cNvSpPr>
+          <p:nvPr>
+            <p:ph type="sldImg"/>
+          </p:nvPr>
+        </p:nvSpPr>
+        <p:spPr/>
+      </p:sp>
+      <p:sp>
+        <p:nvSpPr>
+          <p:cNvPr id="3" name="備忘稿版面配置區 2">
+            <a:extLst>
+              <a:ext uri="{FF2B5EF4-FFF2-40B4-BE49-F238E27FC236}">
+                <a16:creationId xmlns:a16="http://schemas.microsoft.com/office/drawing/2014/main" id="{F5137C03-8009-26B0-FB4E-E04842E8B7CB}"/>
+              </a:ext>
+            </a:extLst>
+          </p:cNvPr>
+          <p:cNvSpPr>
+            <a:spLocks noGrp="1"/>
+          </p:cNvSpPr>
+          <p:nvPr>
+            <p:ph type="body" idx="1"/>
+          </p:nvPr>
+        </p:nvSpPr>
+        <p:spPr/>
+        <p:txBody>
+          <a:bodyPr/>
+          <a:lstStyle/>
+          <a:p>
+            <a:endParaRPr lang="zh-TW" altLang="en-US" dirty="0"/>
+          </a:p>
+        </p:txBody>
+      </p:sp>
+      <p:sp>
+        <p:nvSpPr>
+          <p:cNvPr id="4" name="投影片編號版面配置區 3">
+            <a:extLst>
+              <a:ext uri="{FF2B5EF4-FFF2-40B4-BE49-F238E27FC236}">
+                <a16:creationId xmlns:a16="http://schemas.microsoft.com/office/drawing/2014/main" id="{070D930E-F800-D862-00FF-518846ED3A33}"/>
+              </a:ext>
+            </a:extLst>
+          </p:cNvPr>
+          <p:cNvSpPr>
+            <a:spLocks noGrp="1"/>
+          </p:cNvSpPr>
+          <p:nvPr>
+            <p:ph type="sldNum" sz="quarter" idx="5"/>
+          </p:nvPr>
+        </p:nvSpPr>
+        <p:spPr/>
+        <p:txBody>
+          <a:bodyPr/>
+          <a:lstStyle/>
+          <a:p>
+            <a:fld id="{5281C8EC-84E3-4AA0-83D2-C262AD0C7E35}" type="slidenum">
+              <a:rPr lang="zh-TW" altLang="en-US" smtClean="0"/>
+              <a:t>28</a:t>
+            </a:fld>
+            <a:endParaRPr lang="zh-TW" altLang="en-US"/>
+          </a:p>
+        </p:txBody>
+      </p:sp>
+    </p:spTree>
+    <p:extLst>
+      <p:ext uri="{BB962C8B-B14F-4D97-AF65-F5344CB8AC3E}">
+        <p14:creationId xmlns:p14="http://schemas.microsoft.com/office/powerpoint/2010/main" val="3187046915"/>
+      </p:ext>
+    </p:extLst>
+  </p:cSld>
+  <p:clrMapOvr>
+    <a:masterClrMapping/>
+  </p:clrMapOvr>
+</p:notes>
+</file>
+
+<file path=ppt/notesSlides/notesSlide6.xml><?xml version="1.0" encoding="utf-8"?>
+<p:notes xmlns:a="http://schemas.openxmlformats.org/drawingml/2006/main" xmlns:r="http://schemas.openxmlformats.org/officeDocument/2006/relationships" xmlns:p="http://schemas.openxmlformats.org/presentationml/2006/main">
+  <p:cSld>
+    <p:spTree>
+      <p:nvGrpSpPr>
+        <p:cNvPr id="1" name="">
+          <a:extLst>
+            <a:ext uri="{FF2B5EF4-FFF2-40B4-BE49-F238E27FC236}">
+              <a16:creationId xmlns:a16="http://schemas.microsoft.com/office/drawing/2014/main" id="{C65E1294-43ED-8DF1-665F-2B635BA9575F}"/>
+            </a:ext>
+          </a:extLst>
+        </p:cNvPr>
+        <p:cNvGrpSpPr/>
+        <p:nvPr/>
+      </p:nvGrpSpPr>
+      <p:grpSpPr>
+        <a:xfrm>
+          <a:off x="0" y="0"/>
+          <a:ext cx="0" cy="0"/>
+          <a:chOff x="0" y="0"/>
+          <a:chExt cx="0" cy="0"/>
+        </a:xfrm>
+      </p:grpSpPr>
+      <p:sp>
+        <p:nvSpPr>
+          <p:cNvPr id="2" name="投影片影像版面配置區 1">
+            <a:extLst>
+              <a:ext uri="{FF2B5EF4-FFF2-40B4-BE49-F238E27FC236}">
+                <a16:creationId xmlns:a16="http://schemas.microsoft.com/office/drawing/2014/main" id="{4F885216-94B2-8145-2CEC-72515ABBE9C0}"/>
+              </a:ext>
+            </a:extLst>
+          </p:cNvPr>
+          <p:cNvSpPr>
+            <a:spLocks noGrp="1" noRot="1" noChangeAspect="1"/>
+          </p:cNvSpPr>
+          <p:nvPr>
+            <p:ph type="sldImg"/>
+          </p:nvPr>
+        </p:nvSpPr>
+        <p:spPr/>
+      </p:sp>
+      <p:sp>
+        <p:nvSpPr>
+          <p:cNvPr id="3" name="備忘稿版面配置區 2">
+            <a:extLst>
+              <a:ext uri="{FF2B5EF4-FFF2-40B4-BE49-F238E27FC236}">
+                <a16:creationId xmlns:a16="http://schemas.microsoft.com/office/drawing/2014/main" id="{ED149161-7FDA-7E77-BD6C-BC7CDBFF710F}"/>
+              </a:ext>
+            </a:extLst>
+          </p:cNvPr>
+          <p:cNvSpPr>
+            <a:spLocks noGrp="1"/>
+          </p:cNvSpPr>
+          <p:nvPr>
+            <p:ph type="body" idx="1"/>
+          </p:nvPr>
+        </p:nvSpPr>
+        <p:spPr/>
+        <p:txBody>
+          <a:bodyPr/>
+          <a:lstStyle/>
+          <a:p>
+            <a:endParaRPr lang="zh-TW" altLang="en-US" dirty="0"/>
+          </a:p>
+        </p:txBody>
+      </p:sp>
+      <p:sp>
+        <p:nvSpPr>
+          <p:cNvPr id="4" name="投影片編號版面配置區 3">
+            <a:extLst>
+              <a:ext uri="{FF2B5EF4-FFF2-40B4-BE49-F238E27FC236}">
+                <a16:creationId xmlns:a16="http://schemas.microsoft.com/office/drawing/2014/main" id="{FC41AF2B-3589-1E87-9482-F34B8E29B0FB}"/>
+              </a:ext>
+            </a:extLst>
+          </p:cNvPr>
+          <p:cNvSpPr>
+            <a:spLocks noGrp="1"/>
+          </p:cNvSpPr>
+          <p:nvPr>
+            <p:ph type="sldNum" sz="quarter" idx="5"/>
+          </p:nvPr>
+        </p:nvSpPr>
+        <p:spPr/>
+        <p:txBody>
+          <a:bodyPr/>
+          <a:lstStyle/>
+          <a:p>
+            <a:fld id="{5281C8EC-84E3-4AA0-83D2-C262AD0C7E35}" type="slidenum">
+              <a:rPr lang="zh-TW" altLang="en-US" smtClean="0"/>
+              <a:t>29</a:t>
+            </a:fld>
+            <a:endParaRPr lang="zh-TW" altLang="en-US"/>
+          </a:p>
+        </p:txBody>
+      </p:sp>
+    </p:spTree>
+    <p:extLst>
+      <p:ext uri="{BB962C8B-B14F-4D97-AF65-F5344CB8AC3E}">
+        <p14:creationId xmlns:p14="http://schemas.microsoft.com/office/powerpoint/2010/main" val="1584297608"/>
+      </p:ext>
+    </p:extLst>
+  </p:cSld>
+  <p:clrMapOvr>
+    <a:masterClrMapping/>
+  </p:clrMapOvr>
+</p:notes>
+</file>
+
+<file path=ppt/notesSlides/notesSlide7.xml><?xml version="1.0" encoding="utf-8"?>
+<p:notes xmlns:a="http://schemas.openxmlformats.org/drawingml/2006/main" xmlns:r="http://schemas.openxmlformats.org/officeDocument/2006/relationships" xmlns:p="http://schemas.openxmlformats.org/presentationml/2006/main">
+  <p:cSld>
+    <p:spTree>
+      <p:nvGrpSpPr>
+        <p:cNvPr id="1" name="">
+          <a:extLst>
+            <a:ext uri="{FF2B5EF4-FFF2-40B4-BE49-F238E27FC236}">
+              <a16:creationId xmlns:a16="http://schemas.microsoft.com/office/drawing/2014/main" id="{36FA93A4-7DD5-EF11-01F1-E720985EB7CF}"/>
+            </a:ext>
+          </a:extLst>
+        </p:cNvPr>
+        <p:cNvGrpSpPr/>
+        <p:nvPr/>
+      </p:nvGrpSpPr>
+      <p:grpSpPr>
+        <a:xfrm>
+          <a:off x="0" y="0"/>
+          <a:ext cx="0" cy="0"/>
+          <a:chOff x="0" y="0"/>
+          <a:chExt cx="0" cy="0"/>
+        </a:xfrm>
+      </p:grpSpPr>
+      <p:sp>
+        <p:nvSpPr>
+          <p:cNvPr id="2" name="投影片影像版面配置區 1">
+            <a:extLst>
+              <a:ext uri="{FF2B5EF4-FFF2-40B4-BE49-F238E27FC236}">
+                <a16:creationId xmlns:a16="http://schemas.microsoft.com/office/drawing/2014/main" id="{A004498C-909C-8113-2AEE-AE6C4E511DD1}"/>
+              </a:ext>
+            </a:extLst>
+          </p:cNvPr>
+          <p:cNvSpPr>
+            <a:spLocks noGrp="1" noRot="1" noChangeAspect="1"/>
+          </p:cNvSpPr>
+          <p:nvPr>
+            <p:ph type="sldImg"/>
+          </p:nvPr>
+        </p:nvSpPr>
+        <p:spPr/>
+      </p:sp>
+      <p:sp>
+        <p:nvSpPr>
+          <p:cNvPr id="3" name="備忘稿版面配置區 2">
+            <a:extLst>
+              <a:ext uri="{FF2B5EF4-FFF2-40B4-BE49-F238E27FC236}">
+                <a16:creationId xmlns:a16="http://schemas.microsoft.com/office/drawing/2014/main" id="{F1F1CE46-3ED4-D257-3A50-0C3CADB671A3}"/>
+              </a:ext>
+            </a:extLst>
+          </p:cNvPr>
+          <p:cNvSpPr>
+            <a:spLocks noGrp="1"/>
+          </p:cNvSpPr>
+          <p:nvPr>
+            <p:ph type="body" idx="1"/>
+          </p:nvPr>
+        </p:nvSpPr>
+        <p:spPr/>
+        <p:txBody>
+          <a:bodyPr/>
+          <a:lstStyle/>
+          <a:p>
+            <a:endParaRPr lang="zh-TW" altLang="en-US" dirty="0"/>
+          </a:p>
+        </p:txBody>
+      </p:sp>
+      <p:sp>
+        <p:nvSpPr>
+          <p:cNvPr id="4" name="投影片編號版面配置區 3">
+            <a:extLst>
+              <a:ext uri="{FF2B5EF4-FFF2-40B4-BE49-F238E27FC236}">
+                <a16:creationId xmlns:a16="http://schemas.microsoft.com/office/drawing/2014/main" id="{0CDD6901-E662-9541-6C30-9FE2DD18D84A}"/>
+              </a:ext>
+            </a:extLst>
+          </p:cNvPr>
+          <p:cNvSpPr>
+            <a:spLocks noGrp="1"/>
+          </p:cNvSpPr>
+          <p:nvPr>
+            <p:ph type="sldNum" sz="quarter" idx="5"/>
+          </p:nvPr>
+        </p:nvSpPr>
+        <p:spPr/>
+        <p:txBody>
+          <a:bodyPr/>
+          <a:lstStyle/>
+          <a:p>
+            <a:fld id="{5281C8EC-84E3-4AA0-83D2-C262AD0C7E35}" type="slidenum">
+              <a:rPr lang="zh-TW" altLang="en-US" smtClean="0"/>
+              <a:t>30</a:t>
+            </a:fld>
+            <a:endParaRPr lang="zh-TW" altLang="en-US"/>
+          </a:p>
+        </p:txBody>
+      </p:sp>
+    </p:spTree>
+    <p:extLst>
+      <p:ext uri="{BB962C8B-B14F-4D97-AF65-F5344CB8AC3E}">
+        <p14:creationId xmlns:p14="http://schemas.microsoft.com/office/powerpoint/2010/main" val="2299327285"/>
+      </p:ext>
+    </p:extLst>
+  </p:cSld>
+  <p:clrMapOvr>
+    <a:masterClrMapping/>
+  </p:clrMapOvr>
+</p:notes>
+</file>
+
+<file path=ppt/notesSlides/notesSlide8.xml><?xml version="1.0" encoding="utf-8"?>
+<p:notes xmlns:a="http://schemas.openxmlformats.org/drawingml/2006/main" xmlns:r="http://schemas.openxmlformats.org/officeDocument/2006/relationships" xmlns:p="http://schemas.openxmlformats.org/presentationml/2006/main">
+  <p:cSld>
+    <p:spTree>
+      <p:nvGrpSpPr>
+        <p:cNvPr id="1" name="">
+          <a:extLst>
+            <a:ext uri="{FF2B5EF4-FFF2-40B4-BE49-F238E27FC236}">
+              <a16:creationId xmlns:a16="http://schemas.microsoft.com/office/drawing/2014/main" id="{DC5389DC-D7DD-6548-8222-85D2CB92B2E2}"/>
+            </a:ext>
+          </a:extLst>
+        </p:cNvPr>
+        <p:cNvGrpSpPr/>
+        <p:nvPr/>
+      </p:nvGrpSpPr>
+      <p:grpSpPr>
+        <a:xfrm>
+          <a:off x="0" y="0"/>
+          <a:ext cx="0" cy="0"/>
+          <a:chOff x="0" y="0"/>
+          <a:chExt cx="0" cy="0"/>
+        </a:xfrm>
+      </p:grpSpPr>
+      <p:sp>
+        <p:nvSpPr>
+          <p:cNvPr id="2" name="投影片影像版面配置區 1">
+            <a:extLst>
+              <a:ext uri="{FF2B5EF4-FFF2-40B4-BE49-F238E27FC236}">
+                <a16:creationId xmlns:a16="http://schemas.microsoft.com/office/drawing/2014/main" id="{F4E3CD3E-B736-5319-1575-4C3B50045279}"/>
+              </a:ext>
+            </a:extLst>
+          </p:cNvPr>
+          <p:cNvSpPr>
+            <a:spLocks noGrp="1" noRot="1" noChangeAspect="1"/>
+          </p:cNvSpPr>
+          <p:nvPr>
+            <p:ph type="sldImg"/>
+          </p:nvPr>
+        </p:nvSpPr>
+        <p:spPr/>
+      </p:sp>
+      <p:sp>
+        <p:nvSpPr>
+          <p:cNvPr id="3" name="備忘稿版面配置區 2">
+            <a:extLst>
+              <a:ext uri="{FF2B5EF4-FFF2-40B4-BE49-F238E27FC236}">
+                <a16:creationId xmlns:a16="http://schemas.microsoft.com/office/drawing/2014/main" id="{6848F93F-E9FB-2846-E8EB-D3809328315D}"/>
+              </a:ext>
+            </a:extLst>
+          </p:cNvPr>
+          <p:cNvSpPr>
+            <a:spLocks noGrp="1"/>
+          </p:cNvSpPr>
+          <p:nvPr>
+            <p:ph type="body" idx="1"/>
+          </p:nvPr>
+        </p:nvSpPr>
+        <p:spPr/>
+        <p:txBody>
+          <a:bodyPr/>
+          <a:lstStyle/>
+          <a:p>
+            <a:endParaRPr lang="zh-TW" altLang="en-US" dirty="0"/>
+          </a:p>
+        </p:txBody>
+      </p:sp>
+      <p:sp>
+        <p:nvSpPr>
+          <p:cNvPr id="4" name="投影片編號版面配置區 3">
+            <a:extLst>
+              <a:ext uri="{FF2B5EF4-FFF2-40B4-BE49-F238E27FC236}">
+                <a16:creationId xmlns:a16="http://schemas.microsoft.com/office/drawing/2014/main" id="{C5E5A903-CF9F-4FD2-9ED2-9F499561DAAB}"/>
+              </a:ext>
+            </a:extLst>
+          </p:cNvPr>
+          <p:cNvSpPr>
+            <a:spLocks noGrp="1"/>
+          </p:cNvSpPr>
+          <p:nvPr>
+            <p:ph type="sldNum" sz="quarter" idx="5"/>
+          </p:nvPr>
+        </p:nvSpPr>
+        <p:spPr/>
+        <p:txBody>
+          <a:bodyPr/>
+          <a:lstStyle/>
+          <a:p>
+            <a:fld id="{5281C8EC-84E3-4AA0-83D2-C262AD0C7E35}" type="slidenum">
+              <a:rPr lang="zh-TW" altLang="en-US" smtClean="0"/>
+              <a:t>31</a:t>
+            </a:fld>
+            <a:endParaRPr lang="zh-TW" altLang="en-US"/>
+          </a:p>
+        </p:txBody>
+      </p:sp>
+    </p:spTree>
+    <p:extLst>
+      <p:ext uri="{BB962C8B-B14F-4D97-AF65-F5344CB8AC3E}">
+        <p14:creationId xmlns:p14="http://schemas.microsoft.com/office/powerpoint/2010/main" val="1489981523"/>
+      </p:ext>
+    </p:extLst>
+  </p:cSld>
+  <p:clrMapOvr>
+    <a:masterClrMapping/>
+  </p:clrMapOvr>
+</p:notes>
+</file>
+
 <file path=ppt/slideLayouts/slideLayout1.xml><?xml version="1.0" encoding="utf-8"?>
 <p:sldLayout xmlns:a="http://schemas.openxmlformats.org/drawingml/2006/main" xmlns:r="http://schemas.openxmlformats.org/officeDocument/2006/relationships" xmlns:p="http://schemas.openxmlformats.org/presentationml/2006/main" type="title" preserve="1">
   <p:cSld name="標題投影片">
@@ -920,7 +1605,7 @@
           <a:p>
             <a:fld id="{17ED38C7-CC33-4A9A-AE74-C01421608BED}" type="datetimeFigureOut">
               <a:rPr lang="zh-TW" altLang="en-US" smtClean="0"/>
-              <a:t>2026/1/30</a:t>
+              <a:t>2026/2/2</a:t>
             </a:fld>
             <a:endParaRPr lang="zh-TW" altLang="en-US"/>
           </a:p>
@@ -1090,7 +1775,7 @@
           <a:p>
             <a:fld id="{17ED38C7-CC33-4A9A-AE74-C01421608BED}" type="datetimeFigureOut">
               <a:rPr lang="zh-TW" altLang="en-US" smtClean="0"/>
-              <a:t>2026/1/30</a:t>
+              <a:t>2026/2/2</a:t>
             </a:fld>
             <a:endParaRPr lang="zh-TW" altLang="en-US"/>
           </a:p>
@@ -1270,7 +1955,7 @@
           <a:p>
             <a:fld id="{17ED38C7-CC33-4A9A-AE74-C01421608BED}" type="datetimeFigureOut">
               <a:rPr lang="zh-TW" altLang="en-US" smtClean="0"/>
-              <a:t>2026/1/30</a:t>
+              <a:t>2026/2/2</a:t>
             </a:fld>
             <a:endParaRPr lang="zh-TW" altLang="en-US"/>
           </a:p>
@@ -1440,7 +2125,7 @@
           <a:p>
             <a:fld id="{17ED38C7-CC33-4A9A-AE74-C01421608BED}" type="datetimeFigureOut">
               <a:rPr lang="zh-TW" altLang="en-US" smtClean="0"/>
-              <a:t>2026/1/30</a:t>
+              <a:t>2026/2/2</a:t>
             </a:fld>
             <a:endParaRPr lang="zh-TW" altLang="en-US"/>
           </a:p>
@@ -1686,7 +2371,7 @@
           <a:p>
             <a:fld id="{17ED38C7-CC33-4A9A-AE74-C01421608BED}" type="datetimeFigureOut">
               <a:rPr lang="zh-TW" altLang="en-US" smtClean="0"/>
-              <a:t>2026/1/30</a:t>
+              <a:t>2026/2/2</a:t>
             </a:fld>
             <a:endParaRPr lang="zh-TW" altLang="en-US"/>
           </a:p>
@@ -1918,7 +2603,7 @@
           <a:p>
             <a:fld id="{17ED38C7-CC33-4A9A-AE74-C01421608BED}" type="datetimeFigureOut">
               <a:rPr lang="zh-TW" altLang="en-US" smtClean="0"/>
-              <a:t>2026/1/30</a:t>
+              <a:t>2026/2/2</a:t>
             </a:fld>
             <a:endParaRPr lang="zh-TW" altLang="en-US"/>
           </a:p>
@@ -2285,7 +2970,7 @@
           <a:p>
             <a:fld id="{17ED38C7-CC33-4A9A-AE74-C01421608BED}" type="datetimeFigureOut">
               <a:rPr lang="zh-TW" altLang="en-US" smtClean="0"/>
-              <a:t>2026/1/30</a:t>
+              <a:t>2026/2/2</a:t>
             </a:fld>
             <a:endParaRPr lang="zh-TW" altLang="en-US"/>
           </a:p>
@@ -2403,7 +3088,7 @@
           <a:p>
             <a:fld id="{17ED38C7-CC33-4A9A-AE74-C01421608BED}" type="datetimeFigureOut">
               <a:rPr lang="zh-TW" altLang="en-US" smtClean="0"/>
-              <a:t>2026/1/30</a:t>
+              <a:t>2026/2/2</a:t>
             </a:fld>
             <a:endParaRPr lang="zh-TW" altLang="en-US"/>
           </a:p>
@@ -2498,7 +3183,7 @@
           <a:p>
             <a:fld id="{17ED38C7-CC33-4A9A-AE74-C01421608BED}" type="datetimeFigureOut">
               <a:rPr lang="zh-TW" altLang="en-US" smtClean="0"/>
-              <a:t>2026/1/30</a:t>
+              <a:t>2026/2/2</a:t>
             </a:fld>
             <a:endParaRPr lang="zh-TW" altLang="en-US"/>
           </a:p>
@@ -2775,7 +3460,7 @@
           <a:p>
             <a:fld id="{17ED38C7-CC33-4A9A-AE74-C01421608BED}" type="datetimeFigureOut">
               <a:rPr lang="zh-TW" altLang="en-US" smtClean="0"/>
-              <a:t>2026/1/30</a:t>
+              <a:t>2026/2/2</a:t>
             </a:fld>
             <a:endParaRPr lang="zh-TW" altLang="en-US"/>
           </a:p>
@@ -3032,7 +3717,7 @@
           <a:p>
             <a:fld id="{17ED38C7-CC33-4A9A-AE74-C01421608BED}" type="datetimeFigureOut">
               <a:rPr lang="zh-TW" altLang="en-US" smtClean="0"/>
-              <a:t>2026/1/30</a:t>
+              <a:t>2026/2/2</a:t>
             </a:fld>
             <a:endParaRPr lang="zh-TW" altLang="en-US"/>
           </a:p>
@@ -3245,7 +3930,7 @@
           <a:p>
             <a:fld id="{17ED38C7-CC33-4A9A-AE74-C01421608BED}" type="datetimeFigureOut">
               <a:rPr lang="zh-TW" altLang="en-US" smtClean="0"/>
-              <a:t>2026/1/30</a:t>
+              <a:t>2026/2/2</a:t>
             </a:fld>
             <a:endParaRPr lang="zh-TW" altLang="en-US"/>
           </a:p>
@@ -5412,6 +6097,303 @@
           </a:prstGeom>
         </p:spPr>
       </p:pic>
+      <mc:AlternateContent xmlns:mc="http://schemas.openxmlformats.org/markup-compatibility/2006" xmlns:p14="http://schemas.microsoft.com/office/powerpoint/2010/main">
+        <mc:Choice Requires="p14">
+          <p:contentPart p14:bwMode="auto" r:id="rId3">
+            <p14:nvContentPartPr>
+              <p14:cNvPr id="3" name="筆跡 2">
+                <a:extLst>
+                  <a:ext uri="{FF2B5EF4-FFF2-40B4-BE49-F238E27FC236}">
+                    <a16:creationId xmlns:a16="http://schemas.microsoft.com/office/drawing/2014/main" id="{C75595ED-E9E6-3B56-884A-51C232CC4DA2}"/>
+                  </a:ext>
+                </a:extLst>
+              </p14:cNvPr>
+              <p14:cNvContentPartPr/>
+              <p14:nvPr/>
+            </p14:nvContentPartPr>
+            <p14:xfrm>
+              <a:off x="3350897" y="3157630"/>
+              <a:ext cx="175680" cy="403200"/>
+            </p14:xfrm>
+          </p:contentPart>
+        </mc:Choice>
+        <mc:Fallback xmlns="">
+          <p:pic>
+            <p:nvPicPr>
+              <p:cNvPr id="3" name="筆跡 2">
+                <a:extLst>
+                  <a:ext uri="{FF2B5EF4-FFF2-40B4-BE49-F238E27FC236}">
+                    <a16:creationId xmlns:a16="http://schemas.microsoft.com/office/drawing/2014/main" id="{C75595ED-E9E6-3B56-884A-51C232CC4DA2}"/>
+                  </a:ext>
+                </a:extLst>
+              </p:cNvPr>
+              <p:cNvPicPr/>
+              <p:nvPr/>
+            </p:nvPicPr>
+            <p:blipFill>
+              <a:blip r:embed="rId4"/>
+              <a:stretch>
+                <a:fillRect/>
+              </a:stretch>
+            </p:blipFill>
+            <p:spPr>
+              <a:xfrm>
+                <a:off x="3344777" y="3151510"/>
+                <a:ext cx="187920" cy="415440"/>
+              </a:xfrm>
+              <a:prstGeom prst="rect">
+                <a:avLst/>
+              </a:prstGeom>
+            </p:spPr>
+          </p:pic>
+        </mc:Fallback>
+      </mc:AlternateContent>
+      <p:grpSp>
+        <p:nvGrpSpPr>
+          <p:cNvPr id="9" name="群組 8">
+            <a:extLst>
+              <a:ext uri="{FF2B5EF4-FFF2-40B4-BE49-F238E27FC236}">
+                <a16:creationId xmlns:a16="http://schemas.microsoft.com/office/drawing/2014/main" id="{0F5705F0-2022-DBB0-59DD-C0730E474EEB}"/>
+              </a:ext>
+            </a:extLst>
+          </p:cNvPr>
+          <p:cNvGrpSpPr/>
+          <p:nvPr/>
+        </p:nvGrpSpPr>
+        <p:grpSpPr>
+          <a:xfrm>
+            <a:off x="4331177" y="3064750"/>
+            <a:ext cx="127800" cy="96480"/>
+            <a:chOff x="4331177" y="3064750"/>
+            <a:chExt cx="127800" cy="96480"/>
+          </a:xfrm>
+        </p:grpSpPr>
+        <mc:AlternateContent xmlns:mc="http://schemas.openxmlformats.org/markup-compatibility/2006" xmlns:p14="http://schemas.microsoft.com/office/powerpoint/2010/main">
+          <mc:Choice Requires="p14">
+            <p:contentPart p14:bwMode="auto" r:id="rId5">
+              <p14:nvContentPartPr>
+                <p14:cNvPr id="7" name="筆跡 6">
+                  <a:extLst>
+                    <a:ext uri="{FF2B5EF4-FFF2-40B4-BE49-F238E27FC236}">
+                      <a16:creationId xmlns:a16="http://schemas.microsoft.com/office/drawing/2014/main" id="{8CC197EF-7698-F249-289C-0320C4D7CB95}"/>
+                    </a:ext>
+                  </a:extLst>
+                </p14:cNvPr>
+                <p14:cNvContentPartPr/>
+                <p14:nvPr/>
+              </p14:nvContentPartPr>
+              <p14:xfrm>
+                <a:off x="4343417" y="3102910"/>
+                <a:ext cx="115560" cy="19800"/>
+              </p14:xfrm>
+            </p:contentPart>
+          </mc:Choice>
+          <mc:Fallback xmlns="">
+            <p:pic>
+              <p:nvPicPr>
+                <p:cNvPr id="7" name="筆跡 6">
+                  <a:extLst>
+                    <a:ext uri="{FF2B5EF4-FFF2-40B4-BE49-F238E27FC236}">
+                      <a16:creationId xmlns:a16="http://schemas.microsoft.com/office/drawing/2014/main" id="{8CC197EF-7698-F249-289C-0320C4D7CB95}"/>
+                    </a:ext>
+                  </a:extLst>
+                </p:cNvPr>
+                <p:cNvPicPr/>
+                <p:nvPr/>
+              </p:nvPicPr>
+              <p:blipFill>
+                <a:blip r:embed="rId6"/>
+                <a:stretch>
+                  <a:fillRect/>
+                </a:stretch>
+              </p:blipFill>
+              <p:spPr>
+                <a:xfrm>
+                  <a:off x="4337297" y="3096790"/>
+                  <a:ext cx="127800" cy="32040"/>
+                </a:xfrm>
+                <a:prstGeom prst="rect">
+                  <a:avLst/>
+                </a:prstGeom>
+              </p:spPr>
+            </p:pic>
+          </mc:Fallback>
+        </mc:AlternateContent>
+        <mc:AlternateContent xmlns:mc="http://schemas.openxmlformats.org/markup-compatibility/2006" xmlns:p14="http://schemas.microsoft.com/office/powerpoint/2010/main">
+          <mc:Choice Requires="p14">
+            <p:contentPart p14:bwMode="auto" r:id="rId7">
+              <p14:nvContentPartPr>
+                <p14:cNvPr id="8" name="筆跡 7">
+                  <a:extLst>
+                    <a:ext uri="{FF2B5EF4-FFF2-40B4-BE49-F238E27FC236}">
+                      <a16:creationId xmlns:a16="http://schemas.microsoft.com/office/drawing/2014/main" id="{7433CC82-E7DD-1F29-0B2F-1CEB2C20A29C}"/>
+                    </a:ext>
+                  </a:extLst>
+                </p14:cNvPr>
+                <p14:cNvContentPartPr/>
+                <p14:nvPr/>
+              </p14:nvContentPartPr>
+              <p14:xfrm>
+                <a:off x="4331177" y="3064750"/>
+                <a:ext cx="42120" cy="96480"/>
+              </p14:xfrm>
+            </p:contentPart>
+          </mc:Choice>
+          <mc:Fallback xmlns="">
+            <p:pic>
+              <p:nvPicPr>
+                <p:cNvPr id="8" name="筆跡 7">
+                  <a:extLst>
+                    <a:ext uri="{FF2B5EF4-FFF2-40B4-BE49-F238E27FC236}">
+                      <a16:creationId xmlns:a16="http://schemas.microsoft.com/office/drawing/2014/main" id="{7433CC82-E7DD-1F29-0B2F-1CEB2C20A29C}"/>
+                    </a:ext>
+                  </a:extLst>
+                </p:cNvPr>
+                <p:cNvPicPr/>
+                <p:nvPr/>
+              </p:nvPicPr>
+              <p:blipFill>
+                <a:blip r:embed="rId8"/>
+                <a:stretch>
+                  <a:fillRect/>
+                </a:stretch>
+              </p:blipFill>
+              <p:spPr>
+                <a:xfrm>
+                  <a:off x="4325057" y="3058630"/>
+                  <a:ext cx="54360" cy="108720"/>
+                </a:xfrm>
+                <a:prstGeom prst="rect">
+                  <a:avLst/>
+                </a:prstGeom>
+              </p:spPr>
+            </p:pic>
+          </mc:Fallback>
+        </mc:AlternateContent>
+      </p:grpSp>
+      <p:grpSp>
+        <p:nvGrpSpPr>
+          <p:cNvPr id="12" name="群組 11">
+            <a:extLst>
+              <a:ext uri="{FF2B5EF4-FFF2-40B4-BE49-F238E27FC236}">
+                <a16:creationId xmlns:a16="http://schemas.microsoft.com/office/drawing/2014/main" id="{AB950EC4-E2F1-3E3F-0A3E-950C2C07D0CD}"/>
+              </a:ext>
+            </a:extLst>
+          </p:cNvPr>
+          <p:cNvGrpSpPr/>
+          <p:nvPr/>
+        </p:nvGrpSpPr>
+        <p:grpSpPr>
+          <a:xfrm>
+            <a:off x="4322177" y="3358870"/>
+            <a:ext cx="127080" cy="96120"/>
+            <a:chOff x="4322177" y="3358870"/>
+            <a:chExt cx="127080" cy="96120"/>
+          </a:xfrm>
+        </p:grpSpPr>
+        <mc:AlternateContent xmlns:mc="http://schemas.openxmlformats.org/markup-compatibility/2006" xmlns:p14="http://schemas.microsoft.com/office/powerpoint/2010/main">
+          <mc:Choice Requires="p14">
+            <p:contentPart p14:bwMode="auto" r:id="rId9">
+              <p14:nvContentPartPr>
+                <p14:cNvPr id="10" name="筆跡 9">
+                  <a:extLst>
+                    <a:ext uri="{FF2B5EF4-FFF2-40B4-BE49-F238E27FC236}">
+                      <a16:creationId xmlns:a16="http://schemas.microsoft.com/office/drawing/2014/main" id="{F8DEA8A4-DB4D-8F40-6AE3-DB46733A8AD3}"/>
+                    </a:ext>
+                  </a:extLst>
+                </p14:cNvPr>
+                <p14:cNvContentPartPr/>
+                <p14:nvPr/>
+              </p14:nvContentPartPr>
+              <p14:xfrm>
+                <a:off x="4322177" y="3405670"/>
+                <a:ext cx="115560" cy="11160"/>
+              </p14:xfrm>
+            </p:contentPart>
+          </mc:Choice>
+          <mc:Fallback xmlns="">
+            <p:pic>
+              <p:nvPicPr>
+                <p:cNvPr id="10" name="筆跡 9">
+                  <a:extLst>
+                    <a:ext uri="{FF2B5EF4-FFF2-40B4-BE49-F238E27FC236}">
+                      <a16:creationId xmlns:a16="http://schemas.microsoft.com/office/drawing/2014/main" id="{F8DEA8A4-DB4D-8F40-6AE3-DB46733A8AD3}"/>
+                    </a:ext>
+                  </a:extLst>
+                </p:cNvPr>
+                <p:cNvPicPr/>
+                <p:nvPr/>
+              </p:nvPicPr>
+              <p:blipFill>
+                <a:blip r:embed="rId10"/>
+                <a:stretch>
+                  <a:fillRect/>
+                </a:stretch>
+              </p:blipFill>
+              <p:spPr>
+                <a:xfrm>
+                  <a:off x="4316057" y="3399550"/>
+                  <a:ext cx="127800" cy="23400"/>
+                </a:xfrm>
+                <a:prstGeom prst="rect">
+                  <a:avLst/>
+                </a:prstGeom>
+              </p:spPr>
+            </p:pic>
+          </mc:Fallback>
+        </mc:AlternateContent>
+        <mc:AlternateContent xmlns:mc="http://schemas.openxmlformats.org/markup-compatibility/2006" xmlns:p14="http://schemas.microsoft.com/office/powerpoint/2010/main">
+          <mc:Choice Requires="p14">
+            <p:contentPart p14:bwMode="auto" r:id="rId11">
+              <p14:nvContentPartPr>
+                <p14:cNvPr id="11" name="筆跡 10">
+                  <a:extLst>
+                    <a:ext uri="{FF2B5EF4-FFF2-40B4-BE49-F238E27FC236}">
+                      <a16:creationId xmlns:a16="http://schemas.microsoft.com/office/drawing/2014/main" id="{08C338A2-F11D-6C75-E5D6-8E0C0257B9C8}"/>
+                    </a:ext>
+                  </a:extLst>
+                </p14:cNvPr>
+                <p14:cNvContentPartPr/>
+                <p14:nvPr/>
+              </p14:nvContentPartPr>
+              <p14:xfrm>
+                <a:off x="4400297" y="3358870"/>
+                <a:ext cx="48960" cy="96120"/>
+              </p14:xfrm>
+            </p:contentPart>
+          </mc:Choice>
+          <mc:Fallback xmlns="">
+            <p:pic>
+              <p:nvPicPr>
+                <p:cNvPr id="11" name="筆跡 10">
+                  <a:extLst>
+                    <a:ext uri="{FF2B5EF4-FFF2-40B4-BE49-F238E27FC236}">
+                      <a16:creationId xmlns:a16="http://schemas.microsoft.com/office/drawing/2014/main" id="{08C338A2-F11D-6C75-E5D6-8E0C0257B9C8}"/>
+                    </a:ext>
+                  </a:extLst>
+                </p:cNvPr>
+                <p:cNvPicPr/>
+                <p:nvPr/>
+              </p:nvPicPr>
+              <p:blipFill>
+                <a:blip r:embed="rId12"/>
+                <a:stretch>
+                  <a:fillRect/>
+                </a:stretch>
+              </p:blipFill>
+              <p:spPr>
+                <a:xfrm>
+                  <a:off x="4394177" y="3352750"/>
+                  <a:ext cx="61200" cy="108360"/>
+                </a:xfrm>
+                <a:prstGeom prst="rect">
+                  <a:avLst/>
+                </a:prstGeom>
+              </p:spPr>
+            </p:pic>
+          </mc:Fallback>
+        </mc:AlternateContent>
+      </p:grpSp>
     </p:spTree>
     <p:extLst>
       <p:ext uri="{BB962C8B-B14F-4D97-AF65-F5344CB8AC3E}">
@@ -5448,98 +6430,6 @@
           <a:chExt cx="0" cy="0"/>
         </a:xfrm>
       </p:grpSpPr>
-      <p:sp>
-        <p:nvSpPr>
-          <p:cNvPr id="2" name="TextBox 1">
-            <a:extLst>
-              <a:ext uri="{FF2B5EF4-FFF2-40B4-BE49-F238E27FC236}">
-                <a16:creationId xmlns:a16="http://schemas.microsoft.com/office/drawing/2014/main" id="{C4FAD9E3-5084-8EED-A078-1D23DE16EB33}"/>
-              </a:ext>
-            </a:extLst>
-          </p:cNvPr>
-          <p:cNvSpPr txBox="1"/>
-          <p:nvPr/>
-        </p:nvSpPr>
-        <p:spPr>
-          <a:xfrm>
-            <a:off x="1037771" y="592436"/>
-            <a:ext cx="10116457" cy="830997"/>
-          </a:xfrm>
-          <a:prstGeom prst="rect">
-            <a:avLst/>
-          </a:prstGeom>
-          <a:noFill/>
-        </p:spPr>
-        <p:txBody>
-          <a:bodyPr wrap="square" rtlCol="0">
-            <a:spAutoFit/>
-          </a:bodyPr>
-          <a:lstStyle/>
-          <a:p>
-            <a:r>
-              <a:rPr lang="en-US" altLang="zh-TW" sz="4800" dirty="0"/>
-              <a:t>CO – instruction</a:t>
-            </a:r>
-            <a:endParaRPr lang="zh-TW" altLang="en-US" sz="4800" dirty="0"/>
-          </a:p>
-        </p:txBody>
-      </p:sp>
-      <p:sp>
-        <p:nvSpPr>
-          <p:cNvPr id="3" name="TextBox 2">
-            <a:extLst>
-              <a:ext uri="{FF2B5EF4-FFF2-40B4-BE49-F238E27FC236}">
-                <a16:creationId xmlns:a16="http://schemas.microsoft.com/office/drawing/2014/main" id="{01500482-3284-ED57-FCAF-DAFF600847EF}"/>
-              </a:ext>
-            </a:extLst>
-          </p:cNvPr>
-          <p:cNvSpPr txBox="1"/>
-          <p:nvPr/>
-        </p:nvSpPr>
-        <p:spPr>
-          <a:xfrm>
-            <a:off x="4205514" y="324454"/>
-            <a:ext cx="9238381" cy="1569660"/>
-          </a:xfrm>
-          <a:prstGeom prst="rect">
-            <a:avLst/>
-          </a:prstGeom>
-          <a:noFill/>
-        </p:spPr>
-        <p:txBody>
-          <a:bodyPr wrap="square" rtlCol="0">
-            <a:spAutoFit/>
-          </a:bodyPr>
-          <a:lstStyle/>
-          <a:p>
-            <a:pPr marL="457200" indent="-457200">
-              <a:buAutoNum type="arabicPeriod"/>
-            </a:pPr>
-            <a:r>
-              <a:rPr lang="en-US" altLang="zh-TW" sz="2400" dirty="0"/>
-              <a:t>Amdahl’s law</a:t>
-            </a:r>
-          </a:p>
-          <a:p>
-            <a:pPr marL="1371600" lvl="2" indent="-457200">
-              <a:buAutoNum type="arabicPeriod"/>
-            </a:pPr>
-            <a:endParaRPr lang="en-US" altLang="zh-TW" sz="2400" dirty="0"/>
-          </a:p>
-          <a:p>
-            <a:pPr marL="1371600" lvl="2" indent="-457200">
-              <a:buAutoNum type="arabicPeriod"/>
-            </a:pPr>
-            <a:endParaRPr lang="en-US" altLang="zh-TW" sz="2400" b="0" dirty="0"/>
-          </a:p>
-          <a:p>
-            <a:pPr marL="1371600" lvl="2" indent="-457200">
-              <a:buAutoNum type="arabicPeriod"/>
-            </a:pPr>
-            <a:endParaRPr lang="zh-TW" altLang="en-US" sz="2400" dirty="0"/>
-          </a:p>
-        </p:txBody>
-      </p:sp>
       <p:pic>
         <p:nvPicPr>
           <p:cNvPr id="5" name="圖片 4" descr="一張含有 文字, 數字, 字型, 文件 的圖片&#10;&#10;AI 產生的內容可能不正確。">
@@ -5562,7 +6452,7 @@
         </p:blipFill>
         <p:spPr>
           <a:xfrm>
-            <a:off x="843642" y="1263015"/>
+            <a:off x="843643" y="711380"/>
             <a:ext cx="10504714" cy="5435240"/>
           </a:xfrm>
           <a:prstGeom prst="rect">
@@ -7085,6 +7975,457 @@
     <p:extLst>
       <p:ext uri="{BB962C8B-B14F-4D97-AF65-F5344CB8AC3E}">
         <p14:creationId xmlns:p14="http://schemas.microsoft.com/office/powerpoint/2010/main" val="2603507899"/>
+      </p:ext>
+    </p:extLst>
+  </p:cSld>
+  <p:clrMapOvr>
+    <a:masterClrMapping/>
+  </p:clrMapOvr>
+</p:sld>
+</file>
+
+<file path=ppt/slides/slide27.xml><?xml version="1.0" encoding="utf-8"?>
+<p:sld xmlns:a="http://schemas.openxmlformats.org/drawingml/2006/main" xmlns:r="http://schemas.openxmlformats.org/officeDocument/2006/relationships" xmlns:p="http://schemas.openxmlformats.org/presentationml/2006/main">
+  <p:cSld>
+    <p:spTree>
+      <p:nvGrpSpPr>
+        <p:cNvPr id="1" name="">
+          <a:extLst>
+            <a:ext uri="{FF2B5EF4-FFF2-40B4-BE49-F238E27FC236}">
+              <a16:creationId xmlns:a16="http://schemas.microsoft.com/office/drawing/2014/main" id="{CE5C0822-B4E9-FD2E-6F52-4B957D7A4190}"/>
+            </a:ext>
+          </a:extLst>
+        </p:cNvPr>
+        <p:cNvGrpSpPr/>
+        <p:nvPr/>
+      </p:nvGrpSpPr>
+      <p:grpSpPr>
+        <a:xfrm>
+          <a:off x="0" y="0"/>
+          <a:ext cx="0" cy="0"/>
+          <a:chOff x="0" y="0"/>
+          <a:chExt cx="0" cy="0"/>
+        </a:xfrm>
+      </p:grpSpPr>
+      <p:sp>
+        <p:nvSpPr>
+          <p:cNvPr id="2" name="TextBox 1">
+            <a:extLst>
+              <a:ext uri="{FF2B5EF4-FFF2-40B4-BE49-F238E27FC236}">
+                <a16:creationId xmlns:a16="http://schemas.microsoft.com/office/drawing/2014/main" id="{1AD164B6-7595-69BC-89EE-C43D1AF74174}"/>
+              </a:ext>
+            </a:extLst>
+          </p:cNvPr>
+          <p:cNvSpPr txBox="1"/>
+          <p:nvPr/>
+        </p:nvSpPr>
+        <p:spPr>
+          <a:xfrm>
+            <a:off x="1037771" y="592436"/>
+            <a:ext cx="10116457" cy="830997"/>
+          </a:xfrm>
+          <a:prstGeom prst="rect">
+            <a:avLst/>
+          </a:prstGeom>
+          <a:noFill/>
+        </p:spPr>
+        <p:txBody>
+          <a:bodyPr wrap="square" rtlCol="0">
+            <a:spAutoFit/>
+          </a:bodyPr>
+          <a:lstStyle/>
+          <a:p>
+            <a:r>
+              <a:rPr lang="en-US" altLang="zh-TW" sz="4800" dirty="0"/>
+              <a:t>CO – support procedure</a:t>
+            </a:r>
+            <a:endParaRPr lang="zh-TW" altLang="en-US" sz="4800" dirty="0"/>
+          </a:p>
+        </p:txBody>
+      </p:sp>
+      <p:sp>
+        <p:nvSpPr>
+          <p:cNvPr id="15" name="TextBox 2">
+            <a:extLst>
+              <a:ext uri="{FF2B5EF4-FFF2-40B4-BE49-F238E27FC236}">
+                <a16:creationId xmlns:a16="http://schemas.microsoft.com/office/drawing/2014/main" id="{7088992A-B31B-74F8-44AC-F58BEBC57935}"/>
+              </a:ext>
+            </a:extLst>
+          </p:cNvPr>
+          <p:cNvSpPr txBox="1"/>
+          <p:nvPr/>
+        </p:nvSpPr>
+        <p:spPr>
+          <a:xfrm>
+            <a:off x="1037771" y="1732561"/>
+            <a:ext cx="9238381" cy="3416320"/>
+          </a:xfrm>
+          <a:prstGeom prst="rect">
+            <a:avLst/>
+          </a:prstGeom>
+          <a:noFill/>
+        </p:spPr>
+        <p:txBody>
+          <a:bodyPr wrap="square" rtlCol="0">
+            <a:spAutoFit/>
+          </a:bodyPr>
+          <a:lstStyle/>
+          <a:p>
+            <a:pPr marL="457200" indent="-457200">
+              <a:buAutoNum type="arabicPeriod"/>
+            </a:pPr>
+            <a:r>
+              <a:rPr lang="en-US" altLang="zh-TW" sz="2400" dirty="0"/>
+              <a:t>Function (or procedure)</a:t>
+            </a:r>
+          </a:p>
+          <a:p>
+            <a:pPr marL="914400" lvl="1" indent="-457200">
+              <a:buAutoNum type="arabicPeriod"/>
+            </a:pPr>
+            <a:r>
+              <a:rPr lang="en-US" altLang="zh-TW" sz="2400" dirty="0"/>
+              <a:t>Implement using stack (push parameter to stack before entering function)</a:t>
+            </a:r>
+          </a:p>
+          <a:p>
+            <a:pPr marL="457200" indent="-457200">
+              <a:buAutoNum type="arabicPeriod"/>
+            </a:pPr>
+            <a:endParaRPr lang="en-US" altLang="zh-TW" sz="2400" dirty="0"/>
+          </a:p>
+          <a:p>
+            <a:pPr marL="457200" indent="-457200">
+              <a:buAutoNum type="arabicPeriod"/>
+            </a:pPr>
+            <a:endParaRPr lang="en-US" altLang="zh-TW" sz="2400" dirty="0"/>
+          </a:p>
+          <a:p>
+            <a:pPr marL="914400" lvl="1" indent="-457200">
+              <a:buAutoNum type="arabicPeriod"/>
+            </a:pPr>
+            <a:endParaRPr lang="en-US" altLang="zh-TW" sz="2400" dirty="0"/>
+          </a:p>
+          <a:p>
+            <a:pPr marL="1371600" lvl="2" indent="-457200">
+              <a:buAutoNum type="arabicPeriod"/>
+            </a:pPr>
+            <a:endParaRPr lang="en-US" altLang="zh-TW" sz="2400" dirty="0"/>
+          </a:p>
+          <a:p>
+            <a:pPr marL="1371600" lvl="2" indent="-457200">
+              <a:buAutoNum type="arabicPeriod"/>
+            </a:pPr>
+            <a:endParaRPr lang="en-US" altLang="zh-TW" sz="2400" b="0" dirty="0"/>
+          </a:p>
+          <a:p>
+            <a:pPr marL="1371600" lvl="2" indent="-457200">
+              <a:buAutoNum type="arabicPeriod"/>
+            </a:pPr>
+            <a:endParaRPr lang="zh-TW" altLang="en-US" sz="2400" dirty="0"/>
+          </a:p>
+        </p:txBody>
+      </p:sp>
+      <p:pic>
+        <p:nvPicPr>
+          <p:cNvPr id="6" name="圖片 5" descr="一張含有 文字, 字型, 螢幕擷取畫面 的圖片&#10;&#10;AI 產生的內容可能不正確。">
+            <a:extLst>
+              <a:ext uri="{FF2B5EF4-FFF2-40B4-BE49-F238E27FC236}">
+                <a16:creationId xmlns:a16="http://schemas.microsoft.com/office/drawing/2014/main" id="{FE96545F-45FD-8729-2FBB-C4A19DD44C2D}"/>
+              </a:ext>
+            </a:extLst>
+          </p:cNvPr>
+          <p:cNvPicPr>
+            <a:picLocks noChangeAspect="1"/>
+          </p:cNvPicPr>
+          <p:nvPr/>
+        </p:nvPicPr>
+        <p:blipFill>
+          <a:blip r:embed="rId3"/>
+          <a:stretch>
+            <a:fillRect/>
+          </a:stretch>
+        </p:blipFill>
+        <p:spPr>
+          <a:xfrm>
+            <a:off x="8124854" y="2738473"/>
+            <a:ext cx="2947445" cy="3527091"/>
+          </a:xfrm>
+          <a:prstGeom prst="rect">
+            <a:avLst/>
+          </a:prstGeom>
+        </p:spPr>
+      </p:pic>
+      <p:pic>
+        <p:nvPicPr>
+          <p:cNvPr id="8" name="圖片 7" descr="一張含有 文字, 字型, 螢幕擷取畫面, 筆跡 的圖片&#10;&#10;AI 產生的內容可能不正確。">
+            <a:extLst>
+              <a:ext uri="{FF2B5EF4-FFF2-40B4-BE49-F238E27FC236}">
+                <a16:creationId xmlns:a16="http://schemas.microsoft.com/office/drawing/2014/main" id="{A3921011-FC27-2396-A68D-C80DBC2E1230}"/>
+              </a:ext>
+            </a:extLst>
+          </p:cNvPr>
+          <p:cNvPicPr>
+            <a:picLocks noChangeAspect="1"/>
+          </p:cNvPicPr>
+          <p:nvPr/>
+        </p:nvPicPr>
+        <p:blipFill>
+          <a:blip r:embed="rId4"/>
+          <a:stretch>
+            <a:fillRect/>
+          </a:stretch>
+        </p:blipFill>
+        <p:spPr>
+          <a:xfrm>
+            <a:off x="1833918" y="3544071"/>
+            <a:ext cx="4648849" cy="1724266"/>
+          </a:xfrm>
+          <a:prstGeom prst="rect">
+            <a:avLst/>
+          </a:prstGeom>
+        </p:spPr>
+      </p:pic>
+    </p:spTree>
+    <p:extLst>
+      <p:ext uri="{BB962C8B-B14F-4D97-AF65-F5344CB8AC3E}">
+        <p14:creationId xmlns:p14="http://schemas.microsoft.com/office/powerpoint/2010/main" val="1577087185"/>
+      </p:ext>
+    </p:extLst>
+  </p:cSld>
+  <p:clrMapOvr>
+    <a:masterClrMapping/>
+  </p:clrMapOvr>
+</p:sld>
+</file>
+
+<file path=ppt/slides/slide28.xml><?xml version="1.0" encoding="utf-8"?>
+<p:sld xmlns:a="http://schemas.openxmlformats.org/drawingml/2006/main" xmlns:r="http://schemas.openxmlformats.org/officeDocument/2006/relationships" xmlns:p="http://schemas.openxmlformats.org/presentationml/2006/main">
+  <p:cSld>
+    <p:spTree>
+      <p:nvGrpSpPr>
+        <p:cNvPr id="1" name="">
+          <a:extLst>
+            <a:ext uri="{FF2B5EF4-FFF2-40B4-BE49-F238E27FC236}">
+              <a16:creationId xmlns:a16="http://schemas.microsoft.com/office/drawing/2014/main" id="{D00D7D7E-2606-69DB-D733-51E65ABC5BB1}"/>
+            </a:ext>
+          </a:extLst>
+        </p:cNvPr>
+        <p:cNvGrpSpPr/>
+        <p:nvPr/>
+      </p:nvGrpSpPr>
+      <p:grpSpPr>
+        <a:xfrm>
+          <a:off x="0" y="0"/>
+          <a:ext cx="0" cy="0"/>
+          <a:chOff x="0" y="0"/>
+          <a:chExt cx="0" cy="0"/>
+        </a:xfrm>
+      </p:grpSpPr>
+      <p:pic>
+        <p:nvPicPr>
+          <p:cNvPr id="10" name="圖片 9" descr="一張含有 文字, 螢幕擷取畫面, 字型 的圖片&#10;&#10;AI 產生的內容可能不正確。">
+            <a:extLst>
+              <a:ext uri="{FF2B5EF4-FFF2-40B4-BE49-F238E27FC236}">
+                <a16:creationId xmlns:a16="http://schemas.microsoft.com/office/drawing/2014/main" id="{41489B3E-1815-3E80-3DB5-9EC225FE9797}"/>
+              </a:ext>
+            </a:extLst>
+          </p:cNvPr>
+          <p:cNvPicPr>
+            <a:picLocks noChangeAspect="1"/>
+          </p:cNvPicPr>
+          <p:nvPr/>
+        </p:nvPicPr>
+        <p:blipFill>
+          <a:blip r:embed="rId3"/>
+          <a:stretch>
+            <a:fillRect/>
+          </a:stretch>
+        </p:blipFill>
+        <p:spPr>
+          <a:xfrm>
+            <a:off x="470731" y="192551"/>
+            <a:ext cx="8230749" cy="1657581"/>
+          </a:xfrm>
+          <a:prstGeom prst="rect">
+            <a:avLst/>
+          </a:prstGeom>
+        </p:spPr>
+      </p:pic>
+      <p:pic>
+        <p:nvPicPr>
+          <p:cNvPr id="12" name="圖片 11" descr="一張含有 文字, 螢幕擷取畫面, 軟體, 字型 的圖片&#10;&#10;AI 產生的內容可能不正確。">
+            <a:extLst>
+              <a:ext uri="{FF2B5EF4-FFF2-40B4-BE49-F238E27FC236}">
+                <a16:creationId xmlns:a16="http://schemas.microsoft.com/office/drawing/2014/main" id="{D8832EA3-0BB1-2CFD-8EAA-B10D1BCD9581}"/>
+              </a:ext>
+            </a:extLst>
+          </p:cNvPr>
+          <p:cNvPicPr>
+            <a:picLocks noChangeAspect="1"/>
+          </p:cNvPicPr>
+          <p:nvPr/>
+        </p:nvPicPr>
+        <p:blipFill>
+          <a:blip r:embed="rId4"/>
+          <a:stretch>
+            <a:fillRect/>
+          </a:stretch>
+        </p:blipFill>
+        <p:spPr>
+          <a:xfrm>
+            <a:off x="470731" y="1950834"/>
+            <a:ext cx="5708345" cy="4714615"/>
+          </a:xfrm>
+          <a:prstGeom prst="rect">
+            <a:avLst/>
+          </a:prstGeom>
+        </p:spPr>
+      </p:pic>
+      <p:pic>
+        <p:nvPicPr>
+          <p:cNvPr id="4" name="圖片 3" descr="一張含有 文字, 螢幕擷取畫面, 行, 字型 的圖片&#10;&#10;AI 產生的內容可能不正確。">
+            <a:extLst>
+              <a:ext uri="{FF2B5EF4-FFF2-40B4-BE49-F238E27FC236}">
+                <a16:creationId xmlns:a16="http://schemas.microsoft.com/office/drawing/2014/main" id="{47A0BE9E-6EBA-C64A-30F6-BEF6F975F831}"/>
+              </a:ext>
+            </a:extLst>
+          </p:cNvPr>
+          <p:cNvPicPr>
+            <a:picLocks noChangeAspect="1"/>
+          </p:cNvPicPr>
+          <p:nvPr/>
+        </p:nvPicPr>
+        <p:blipFill>
+          <a:blip r:embed="rId5"/>
+          <a:stretch>
+            <a:fillRect/>
+          </a:stretch>
+        </p:blipFill>
+        <p:spPr>
+          <a:xfrm>
+            <a:off x="6588503" y="2797628"/>
+            <a:ext cx="5402239" cy="2832069"/>
+          </a:xfrm>
+          <a:prstGeom prst="rect">
+            <a:avLst/>
+          </a:prstGeom>
+        </p:spPr>
+      </p:pic>
+    </p:spTree>
+    <p:extLst>
+      <p:ext uri="{BB962C8B-B14F-4D97-AF65-F5344CB8AC3E}">
+        <p14:creationId xmlns:p14="http://schemas.microsoft.com/office/powerpoint/2010/main" val="154248235"/>
+      </p:ext>
+    </p:extLst>
+  </p:cSld>
+  <p:clrMapOvr>
+    <a:masterClrMapping/>
+  </p:clrMapOvr>
+</p:sld>
+</file>
+
+<file path=ppt/slides/slide29.xml><?xml version="1.0" encoding="utf-8"?>
+<p:sld xmlns:a="http://schemas.openxmlformats.org/drawingml/2006/main" xmlns:r="http://schemas.openxmlformats.org/officeDocument/2006/relationships" xmlns:p="http://schemas.openxmlformats.org/presentationml/2006/main">
+  <p:cSld>
+    <p:spTree>
+      <p:nvGrpSpPr>
+        <p:cNvPr id="1" name="">
+          <a:extLst>
+            <a:ext uri="{FF2B5EF4-FFF2-40B4-BE49-F238E27FC236}">
+              <a16:creationId xmlns:a16="http://schemas.microsoft.com/office/drawing/2014/main" id="{9A3B694C-6381-4313-E381-D38BF8B6B729}"/>
+            </a:ext>
+          </a:extLst>
+        </p:cNvPr>
+        <p:cNvGrpSpPr/>
+        <p:nvPr/>
+      </p:nvGrpSpPr>
+      <p:grpSpPr>
+        <a:xfrm>
+          <a:off x="0" y="0"/>
+          <a:ext cx="0" cy="0"/>
+          <a:chOff x="0" y="0"/>
+          <a:chExt cx="0" cy="0"/>
+        </a:xfrm>
+      </p:grpSpPr>
+      <p:sp>
+        <p:nvSpPr>
+          <p:cNvPr id="2" name="TextBox 1">
+            <a:extLst>
+              <a:ext uri="{FF2B5EF4-FFF2-40B4-BE49-F238E27FC236}">
+                <a16:creationId xmlns:a16="http://schemas.microsoft.com/office/drawing/2014/main" id="{AF590D5A-293F-E6CB-7D1C-36135ED2187C}"/>
+              </a:ext>
+            </a:extLst>
+          </p:cNvPr>
+          <p:cNvSpPr txBox="1"/>
+          <p:nvPr/>
+        </p:nvSpPr>
+        <p:spPr>
+          <a:xfrm>
+            <a:off x="1037771" y="592436"/>
+            <a:ext cx="10116457" cy="830997"/>
+          </a:xfrm>
+          <a:prstGeom prst="rect">
+            <a:avLst/>
+          </a:prstGeom>
+          <a:noFill/>
+        </p:spPr>
+        <p:txBody>
+          <a:bodyPr wrap="square" rtlCol="0">
+            <a:spAutoFit/>
+          </a:bodyPr>
+          <a:lstStyle/>
+          <a:p>
+            <a:r>
+              <a:rPr lang="en-US" altLang="zh-TW" sz="4800" dirty="0"/>
+              <a:t>CO – cache </a:t>
+            </a:r>
+            <a:r>
+              <a:rPr lang="en-US" altLang="zh-TW" sz="4800" dirty="0" err="1"/>
+              <a:t>v.s</a:t>
+            </a:r>
+            <a:r>
+              <a:rPr lang="en-US" altLang="zh-TW" sz="4800" dirty="0"/>
+              <a:t>. memory </a:t>
+            </a:r>
+            <a:endParaRPr lang="zh-TW" altLang="en-US" sz="4800" dirty="0"/>
+          </a:p>
+        </p:txBody>
+      </p:sp>
+      <p:pic>
+        <p:nvPicPr>
+          <p:cNvPr id="5" name="圖片 4" descr="一張含有 文字, 螢幕擷取畫面, 軟體 的圖片&#10;&#10;AI 產生的內容可能不正確。">
+            <a:extLst>
+              <a:ext uri="{FF2B5EF4-FFF2-40B4-BE49-F238E27FC236}">
+                <a16:creationId xmlns:a16="http://schemas.microsoft.com/office/drawing/2014/main" id="{FA333EEE-72A1-0029-816E-64B403EA798C}"/>
+              </a:ext>
+            </a:extLst>
+          </p:cNvPr>
+          <p:cNvPicPr>
+            <a:picLocks noChangeAspect="1"/>
+          </p:cNvPicPr>
+          <p:nvPr/>
+        </p:nvPicPr>
+        <p:blipFill>
+          <a:blip r:embed="rId3"/>
+          <a:stretch>
+            <a:fillRect/>
+          </a:stretch>
+        </p:blipFill>
+        <p:spPr>
+          <a:xfrm>
+            <a:off x="2279952" y="1607357"/>
+            <a:ext cx="7187927" cy="4473657"/>
+          </a:xfrm>
+          <a:prstGeom prst="rect">
+            <a:avLst/>
+          </a:prstGeom>
+        </p:spPr>
+      </p:pic>
+    </p:spTree>
+    <p:extLst>
+      <p:ext uri="{BB962C8B-B14F-4D97-AF65-F5344CB8AC3E}">
+        <p14:creationId xmlns:p14="http://schemas.microsoft.com/office/powerpoint/2010/main" val="10126727"/>
       </p:ext>
     </p:extLst>
   </p:cSld>
@@ -7502,6 +8843,395 @@
     <p:extLst>
       <p:ext uri="{BB962C8B-B14F-4D97-AF65-F5344CB8AC3E}">
         <p14:creationId xmlns:p14="http://schemas.microsoft.com/office/powerpoint/2010/main" val="2135991365"/>
+      </p:ext>
+    </p:extLst>
+  </p:cSld>
+  <p:clrMapOvr>
+    <a:masterClrMapping/>
+  </p:clrMapOvr>
+</p:sld>
+</file>
+
+<file path=ppt/slides/slide30.xml><?xml version="1.0" encoding="utf-8"?>
+<p:sld xmlns:a="http://schemas.openxmlformats.org/drawingml/2006/main" xmlns:r="http://schemas.openxmlformats.org/officeDocument/2006/relationships" xmlns:p="http://schemas.openxmlformats.org/presentationml/2006/main">
+  <p:cSld>
+    <p:spTree>
+      <p:nvGrpSpPr>
+        <p:cNvPr id="1" name="">
+          <a:extLst>
+            <a:ext uri="{FF2B5EF4-FFF2-40B4-BE49-F238E27FC236}">
+              <a16:creationId xmlns:a16="http://schemas.microsoft.com/office/drawing/2014/main" id="{8CC913CD-F0E3-220D-72F5-635C3825E845}"/>
+            </a:ext>
+          </a:extLst>
+        </p:cNvPr>
+        <p:cNvGrpSpPr/>
+        <p:nvPr/>
+      </p:nvGrpSpPr>
+      <p:grpSpPr>
+        <a:xfrm>
+          <a:off x="0" y="0"/>
+          <a:ext cx="0" cy="0"/>
+          <a:chOff x="0" y="0"/>
+          <a:chExt cx="0" cy="0"/>
+        </a:xfrm>
+      </p:grpSpPr>
+      <p:sp>
+        <p:nvSpPr>
+          <p:cNvPr id="2" name="TextBox 1">
+            <a:extLst>
+              <a:ext uri="{FF2B5EF4-FFF2-40B4-BE49-F238E27FC236}">
+                <a16:creationId xmlns:a16="http://schemas.microsoft.com/office/drawing/2014/main" id="{306EA064-5FFE-9133-B38F-B59C7058301C}"/>
+              </a:ext>
+            </a:extLst>
+          </p:cNvPr>
+          <p:cNvSpPr txBox="1"/>
+          <p:nvPr/>
+        </p:nvSpPr>
+        <p:spPr>
+          <a:xfrm>
+            <a:off x="1037771" y="592436"/>
+            <a:ext cx="10116457" cy="830997"/>
+          </a:xfrm>
+          <a:prstGeom prst="rect">
+            <a:avLst/>
+          </a:prstGeom>
+          <a:noFill/>
+        </p:spPr>
+        <p:txBody>
+          <a:bodyPr wrap="square" rtlCol="0">
+            <a:spAutoFit/>
+          </a:bodyPr>
+          <a:lstStyle/>
+          <a:p>
+            <a:r>
+              <a:rPr lang="en-US" altLang="zh-TW" sz="4800" dirty="0"/>
+              <a:t>CO – memory</a:t>
+            </a:r>
+            <a:endParaRPr lang="zh-TW" altLang="en-US" sz="4800" dirty="0"/>
+          </a:p>
+        </p:txBody>
+      </p:sp>
+      <p:sp>
+        <p:nvSpPr>
+          <p:cNvPr id="15" name="TextBox 2">
+            <a:extLst>
+              <a:ext uri="{FF2B5EF4-FFF2-40B4-BE49-F238E27FC236}">
+                <a16:creationId xmlns:a16="http://schemas.microsoft.com/office/drawing/2014/main" id="{578ABD74-FDC6-6EE9-9205-8FF23D7598DF}"/>
+              </a:ext>
+            </a:extLst>
+          </p:cNvPr>
+          <p:cNvSpPr txBox="1"/>
+          <p:nvPr/>
+        </p:nvSpPr>
+        <p:spPr>
+          <a:xfrm>
+            <a:off x="1037771" y="1732561"/>
+            <a:ext cx="9238381" cy="3416320"/>
+          </a:xfrm>
+          <a:prstGeom prst="rect">
+            <a:avLst/>
+          </a:prstGeom>
+          <a:noFill/>
+        </p:spPr>
+        <p:txBody>
+          <a:bodyPr wrap="square" rtlCol="0">
+            <a:spAutoFit/>
+          </a:bodyPr>
+          <a:lstStyle/>
+          <a:p>
+            <a:pPr marL="457200" indent="-457200">
+              <a:buAutoNum type="arabicPeriod"/>
+            </a:pPr>
+            <a:r>
+              <a:rPr lang="en-US" altLang="zh-TW" sz="2400" dirty="0"/>
+              <a:t>Locality</a:t>
+            </a:r>
+          </a:p>
+          <a:p>
+            <a:pPr marL="914400" lvl="1" indent="-457200">
+              <a:buAutoNum type="arabicPeriod"/>
+            </a:pPr>
+            <a:r>
+              <a:rPr lang="en-US" altLang="zh-TW" sz="2400" dirty="0"/>
+              <a:t>Temporal locality (locality in time)</a:t>
+            </a:r>
+          </a:p>
+          <a:p>
+            <a:pPr marL="914400" lvl="1" indent="-457200">
+              <a:buAutoNum type="arabicPeriod"/>
+            </a:pPr>
+            <a:r>
+              <a:rPr lang="en-US" altLang="zh-TW" sz="2400" dirty="0"/>
+              <a:t>Spatial locality (locality in space)</a:t>
+            </a:r>
+          </a:p>
+          <a:p>
+            <a:pPr marL="457200" indent="-457200">
+              <a:buAutoNum type="arabicPeriod"/>
+            </a:pPr>
+            <a:endParaRPr lang="en-US" altLang="zh-TW" sz="2400" dirty="0"/>
+          </a:p>
+          <a:p>
+            <a:pPr marL="457200" indent="-457200">
+              <a:buAutoNum type="arabicPeriod"/>
+            </a:pPr>
+            <a:endParaRPr lang="en-US" altLang="zh-TW" sz="2400" dirty="0"/>
+          </a:p>
+          <a:p>
+            <a:pPr marL="914400" lvl="1" indent="-457200">
+              <a:buAutoNum type="arabicPeriod"/>
+            </a:pPr>
+            <a:endParaRPr lang="en-US" altLang="zh-TW" sz="2400" dirty="0"/>
+          </a:p>
+          <a:p>
+            <a:pPr marL="1371600" lvl="2" indent="-457200">
+              <a:buAutoNum type="arabicPeriod"/>
+            </a:pPr>
+            <a:endParaRPr lang="en-US" altLang="zh-TW" sz="2400" dirty="0"/>
+          </a:p>
+          <a:p>
+            <a:pPr marL="1371600" lvl="2" indent="-457200">
+              <a:buAutoNum type="arabicPeriod"/>
+            </a:pPr>
+            <a:endParaRPr lang="en-US" altLang="zh-TW" sz="2400" b="0" dirty="0"/>
+          </a:p>
+          <a:p>
+            <a:pPr marL="1371600" lvl="2" indent="-457200">
+              <a:buAutoNum type="arabicPeriod"/>
+            </a:pPr>
+            <a:endParaRPr lang="zh-TW" altLang="en-US" sz="2400" dirty="0"/>
+          </a:p>
+        </p:txBody>
+      </p:sp>
+      <p:pic>
+        <p:nvPicPr>
+          <p:cNvPr id="4" name="圖片 3" descr="一張含有 文字, 字型, 螢幕擷取畫面 的圖片&#10;&#10;AI 產生的內容可能不正確。">
+            <a:extLst>
+              <a:ext uri="{FF2B5EF4-FFF2-40B4-BE49-F238E27FC236}">
+                <a16:creationId xmlns:a16="http://schemas.microsoft.com/office/drawing/2014/main" id="{BBCB5025-8522-A390-C6E4-2669BBC139A6}"/>
+              </a:ext>
+            </a:extLst>
+          </p:cNvPr>
+          <p:cNvPicPr>
+            <a:picLocks noChangeAspect="1"/>
+          </p:cNvPicPr>
+          <p:nvPr/>
+        </p:nvPicPr>
+        <p:blipFill>
+          <a:blip r:embed="rId3"/>
+          <a:stretch>
+            <a:fillRect/>
+          </a:stretch>
+        </p:blipFill>
+        <p:spPr>
+          <a:xfrm>
+            <a:off x="8070810" y="416105"/>
+            <a:ext cx="3801005" cy="5210902"/>
+          </a:xfrm>
+          <a:prstGeom prst="rect">
+            <a:avLst/>
+          </a:prstGeom>
+        </p:spPr>
+      </p:pic>
+    </p:spTree>
+    <p:extLst>
+      <p:ext uri="{BB962C8B-B14F-4D97-AF65-F5344CB8AC3E}">
+        <p14:creationId xmlns:p14="http://schemas.microsoft.com/office/powerpoint/2010/main" val="1325899591"/>
+      </p:ext>
+    </p:extLst>
+  </p:cSld>
+  <p:clrMapOvr>
+    <a:masterClrMapping/>
+  </p:clrMapOvr>
+</p:sld>
+</file>
+
+<file path=ppt/slides/slide31.xml><?xml version="1.0" encoding="utf-8"?>
+<p:sld xmlns:a="http://schemas.openxmlformats.org/drawingml/2006/main" xmlns:r="http://schemas.openxmlformats.org/officeDocument/2006/relationships" xmlns:p="http://schemas.openxmlformats.org/presentationml/2006/main">
+  <p:cSld>
+    <p:spTree>
+      <p:nvGrpSpPr>
+        <p:cNvPr id="1" name="">
+          <a:extLst>
+            <a:ext uri="{FF2B5EF4-FFF2-40B4-BE49-F238E27FC236}">
+              <a16:creationId xmlns:a16="http://schemas.microsoft.com/office/drawing/2014/main" id="{7D6FB06C-6B3E-B60A-FA5A-A32C58CACEA9}"/>
+            </a:ext>
+          </a:extLst>
+        </p:cNvPr>
+        <p:cNvGrpSpPr/>
+        <p:nvPr/>
+      </p:nvGrpSpPr>
+      <p:grpSpPr>
+        <a:xfrm>
+          <a:off x="0" y="0"/>
+          <a:ext cx="0" cy="0"/>
+          <a:chOff x="0" y="0"/>
+          <a:chExt cx="0" cy="0"/>
+        </a:xfrm>
+      </p:grpSpPr>
+      <p:sp>
+        <p:nvSpPr>
+          <p:cNvPr id="2" name="TextBox 1">
+            <a:extLst>
+              <a:ext uri="{FF2B5EF4-FFF2-40B4-BE49-F238E27FC236}">
+                <a16:creationId xmlns:a16="http://schemas.microsoft.com/office/drawing/2014/main" id="{B63599BD-7266-2ADC-1A0E-A62DD2D17BF2}"/>
+              </a:ext>
+            </a:extLst>
+          </p:cNvPr>
+          <p:cNvSpPr txBox="1"/>
+          <p:nvPr/>
+        </p:nvSpPr>
+        <p:spPr>
+          <a:xfrm>
+            <a:off x="1037771" y="592436"/>
+            <a:ext cx="10116457" cy="830997"/>
+          </a:xfrm>
+          <a:prstGeom prst="rect">
+            <a:avLst/>
+          </a:prstGeom>
+          <a:noFill/>
+        </p:spPr>
+        <p:txBody>
+          <a:bodyPr wrap="square" rtlCol="0">
+            <a:spAutoFit/>
+          </a:bodyPr>
+          <a:lstStyle/>
+          <a:p>
+            <a:r>
+              <a:rPr lang="en-US" altLang="zh-TW" sz="4800" dirty="0"/>
+              <a:t>CO – memory hierarchy</a:t>
+            </a:r>
+            <a:endParaRPr lang="zh-TW" altLang="en-US" sz="4800" dirty="0"/>
+          </a:p>
+        </p:txBody>
+      </p:sp>
+      <p:sp>
+        <p:nvSpPr>
+          <p:cNvPr id="15" name="TextBox 2">
+            <a:extLst>
+              <a:ext uri="{FF2B5EF4-FFF2-40B4-BE49-F238E27FC236}">
+                <a16:creationId xmlns:a16="http://schemas.microsoft.com/office/drawing/2014/main" id="{B54DDCCC-EFFD-4FCB-5253-CFA6B715AB35}"/>
+              </a:ext>
+            </a:extLst>
+          </p:cNvPr>
+          <p:cNvSpPr txBox="1"/>
+          <p:nvPr/>
+        </p:nvSpPr>
+        <p:spPr>
+          <a:xfrm>
+            <a:off x="1037771" y="1732561"/>
+            <a:ext cx="9238381" cy="1938992"/>
+          </a:xfrm>
+          <a:prstGeom prst="rect">
+            <a:avLst/>
+          </a:prstGeom>
+          <a:noFill/>
+        </p:spPr>
+        <p:txBody>
+          <a:bodyPr wrap="square" rtlCol="0">
+            <a:spAutoFit/>
+          </a:bodyPr>
+          <a:lstStyle/>
+          <a:p>
+            <a:pPr marL="457200" indent="-457200">
+              <a:buAutoNum type="arabicPeriod"/>
+            </a:pPr>
+            <a:r>
+              <a:rPr lang="en-US" altLang="zh-TW" sz="2400" dirty="0" err="1"/>
+              <a:t>fd</a:t>
+            </a:r>
+            <a:endParaRPr lang="en-US" altLang="zh-TW" sz="2400" dirty="0"/>
+          </a:p>
+          <a:p>
+            <a:pPr marL="914400" lvl="1" indent="-457200">
+              <a:buAutoNum type="arabicPeriod"/>
+            </a:pPr>
+            <a:endParaRPr lang="en-US" altLang="zh-TW" sz="2400" dirty="0"/>
+          </a:p>
+          <a:p>
+            <a:pPr marL="1371600" lvl="2" indent="-457200">
+              <a:buAutoNum type="arabicPeriod"/>
+            </a:pPr>
+            <a:endParaRPr lang="en-US" altLang="zh-TW" sz="2400" dirty="0"/>
+          </a:p>
+          <a:p>
+            <a:pPr marL="1371600" lvl="2" indent="-457200">
+              <a:buAutoNum type="arabicPeriod"/>
+            </a:pPr>
+            <a:endParaRPr lang="en-US" altLang="zh-TW" sz="2400" b="0" dirty="0"/>
+          </a:p>
+          <a:p>
+            <a:pPr marL="1371600" lvl="2" indent="-457200">
+              <a:buAutoNum type="arabicPeriod"/>
+            </a:pPr>
+            <a:endParaRPr lang="zh-TW" altLang="en-US" sz="2400" dirty="0"/>
+          </a:p>
+        </p:txBody>
+      </p:sp>
+      <p:pic>
+        <p:nvPicPr>
+          <p:cNvPr id="5" name="圖片 4" descr="一張含有 文字, 圖表, 螢幕擷取畫面, 行 的圖片&#10;&#10;AI 產生的內容可能不正確。">
+            <a:extLst>
+              <a:ext uri="{FF2B5EF4-FFF2-40B4-BE49-F238E27FC236}">
+                <a16:creationId xmlns:a16="http://schemas.microsoft.com/office/drawing/2014/main" id="{46CEF69E-B786-10DC-5B2B-E49B8B359010}"/>
+              </a:ext>
+            </a:extLst>
+          </p:cNvPr>
+          <p:cNvPicPr>
+            <a:picLocks noChangeAspect="1"/>
+          </p:cNvPicPr>
+          <p:nvPr/>
+        </p:nvPicPr>
+        <p:blipFill>
+          <a:blip r:embed="rId3"/>
+          <a:stretch>
+            <a:fillRect/>
+          </a:stretch>
+        </p:blipFill>
+        <p:spPr>
+          <a:xfrm>
+            <a:off x="4974771" y="2702057"/>
+            <a:ext cx="7021286" cy="3869458"/>
+          </a:xfrm>
+          <a:prstGeom prst="rect">
+            <a:avLst/>
+          </a:prstGeom>
+        </p:spPr>
+      </p:pic>
+      <p:pic>
+        <p:nvPicPr>
+          <p:cNvPr id="7" name="圖片 6" descr="一張含有 文字, 字型, 螢幕擷取畫面 的圖片&#10;&#10;AI 產生的內容可能不正確。">
+            <a:extLst>
+              <a:ext uri="{FF2B5EF4-FFF2-40B4-BE49-F238E27FC236}">
+                <a16:creationId xmlns:a16="http://schemas.microsoft.com/office/drawing/2014/main" id="{9E28F7EA-4E74-F01B-64B3-95F3D738172C}"/>
+              </a:ext>
+            </a:extLst>
+          </p:cNvPr>
+          <p:cNvPicPr>
+            <a:picLocks noChangeAspect="1"/>
+          </p:cNvPicPr>
+          <p:nvPr/>
+        </p:nvPicPr>
+        <p:blipFill>
+          <a:blip r:embed="rId4"/>
+          <a:stretch>
+            <a:fillRect/>
+          </a:stretch>
+        </p:blipFill>
+        <p:spPr>
+          <a:xfrm>
+            <a:off x="859933" y="2787029"/>
+            <a:ext cx="3553145" cy="3302923"/>
+          </a:xfrm>
+          <a:prstGeom prst="rect">
+            <a:avLst/>
+          </a:prstGeom>
+        </p:spPr>
+      </p:pic>
+    </p:spTree>
+    <p:extLst>
+      <p:ext uri="{BB962C8B-B14F-4D97-AF65-F5344CB8AC3E}">
+        <p14:creationId xmlns:p14="http://schemas.microsoft.com/office/powerpoint/2010/main" val="4146605283"/>
       </p:ext>
     </p:extLst>
   </p:cSld>

</xml_diff>